<commit_message>
Add presentation chapters for exercise 4 and 5.
</commit_message>
<xml_diff>
--- a/presentation/MDSD-Abschlusspraesentation.pptx
+++ b/presentation/MDSD-Abschlusspraesentation.pptx
@@ -5,10 +5,10 @@
     <p:sldMasterId id="2147483648" r:id="rId1"/>
   </p:sldMasterIdLst>
   <p:notesMasterIdLst>
-    <p:notesMasterId r:id="rId10"/>
+    <p:notesMasterId r:id="rId18"/>
   </p:notesMasterIdLst>
   <p:handoutMasterIdLst>
-    <p:handoutMasterId r:id="rId11"/>
+    <p:handoutMasterId r:id="rId19"/>
   </p:handoutMasterIdLst>
   <p:sldIdLst>
     <p:sldId id="256" r:id="rId2"/>
@@ -17,8 +17,16 @@
     <p:sldId id="300" r:id="rId5"/>
     <p:sldId id="301" r:id="rId6"/>
     <p:sldId id="302" r:id="rId7"/>
-    <p:sldId id="303" r:id="rId8"/>
-    <p:sldId id="304" r:id="rId9"/>
+    <p:sldId id="309" r:id="rId8"/>
+    <p:sldId id="310" r:id="rId9"/>
+    <p:sldId id="312" r:id="rId10"/>
+    <p:sldId id="311" r:id="rId11"/>
+    <p:sldId id="303" r:id="rId12"/>
+    <p:sldId id="305" r:id="rId13"/>
+    <p:sldId id="306" r:id="rId14"/>
+    <p:sldId id="307" r:id="rId15"/>
+    <p:sldId id="308" r:id="rId16"/>
+    <p:sldId id="304" r:id="rId17"/>
   </p:sldIdLst>
   <p:sldSz cx="9144000" cy="6858000" type="screen4x3"/>
   <p:notesSz cx="6858000" cy="9144000"/>
@@ -128,7 +136,15 @@
             <p14:sldId id="300"/>
             <p14:sldId id="301"/>
             <p14:sldId id="302"/>
+            <p14:sldId id="309"/>
+            <p14:sldId id="310"/>
+            <p14:sldId id="312"/>
+            <p14:sldId id="311"/>
             <p14:sldId id="303"/>
+            <p14:sldId id="305"/>
+            <p14:sldId id="306"/>
+            <p14:sldId id="307"/>
+            <p14:sldId id="308"/>
             <p14:sldId id="304"/>
           </p14:sldIdLst>
         </p14:section>
@@ -220,7 +236,7 @@
           <a:p>
             <a:fld id="{36729675-C644-6E46-8A9C-6A4F26267E24}" type="datetimeFigureOut">
               <a:rPr lang="de-DE" smtClean="0"/>
-              <a:t>13.07.16</a:t>
+              <a:t>18.07.16</a:t>
             </a:fld>
             <a:endParaRPr lang="de-DE"/>
           </a:p>
@@ -386,7 +402,7 @@
           <a:p>
             <a:fld id="{0EA486D8-2136-344F-A443-C62CACD96E34}" type="datetimeFigureOut">
               <a:rPr lang="de-DE" smtClean="0"/>
-              <a:t>13.07.16</a:t>
+              <a:t>18.07.16</a:t>
             </a:fld>
             <a:endParaRPr lang="de-DE"/>
           </a:p>
@@ -858,7 +874,7 @@
                 <a:latin typeface="Fira Sans SemiBold Italic"/>
                 <a:cs typeface="Fira Sans SemiBold Italic"/>
               </a:rPr>
-              <a:t>Mittwoch, 13. Juli 16</a:t>
+              <a:t>Montag, 18. Juli 16</a:t>
             </a:fld>
             <a:endParaRPr lang="de-DE" b="0" i="0" dirty="0">
               <a:solidFill>
@@ -3253,6 +3269,1801 @@
 </p:sld>
 </file>
 
+<file path=ppt/slides/slide10.xml><?xml version="1.0" encoding="utf-8"?>
+<p:sld xmlns:a="http://schemas.openxmlformats.org/drawingml/2006/main" xmlns:r="http://schemas.openxmlformats.org/officeDocument/2006/relationships" xmlns:p="http://schemas.openxmlformats.org/presentationml/2006/main">
+  <p:cSld>
+    <p:spTree>
+      <p:nvGrpSpPr>
+        <p:cNvPr id="1" name=""/>
+        <p:cNvGrpSpPr/>
+        <p:nvPr/>
+      </p:nvGrpSpPr>
+      <p:grpSpPr>
+        <a:xfrm>
+          <a:off x="0" y="0"/>
+          <a:ext cx="0" cy="0"/>
+          <a:chOff x="0" y="0"/>
+          <a:chExt cx="0" cy="0"/>
+        </a:xfrm>
+      </p:grpSpPr>
+      <p:sp>
+        <p:nvSpPr>
+          <p:cNvPr id="2" name="Titel 1"/>
+          <p:cNvSpPr>
+            <a:spLocks noGrp="1"/>
+          </p:cNvSpPr>
+          <p:nvPr>
+            <p:ph type="title"/>
+          </p:nvPr>
+        </p:nvSpPr>
+        <p:spPr/>
+        <p:txBody>
+          <a:bodyPr/>
+          <a:lstStyle/>
+          <a:p>
+            <a:r>
+              <a:rPr lang="de-DE" dirty="0" smtClean="0"/>
+              <a:t>Was haben wir bei dieser Aufgabe gelernt?</a:t>
+            </a:r>
+            <a:endParaRPr lang="de-DE" dirty="0"/>
+          </a:p>
+        </p:txBody>
+      </p:sp>
+      <p:sp>
+        <p:nvSpPr>
+          <p:cNvPr id="3" name="Inhaltsplatzhalter 2"/>
+          <p:cNvSpPr>
+            <a:spLocks noGrp="1"/>
+          </p:cNvSpPr>
+          <p:nvPr>
+            <p:ph idx="1"/>
+          </p:nvPr>
+        </p:nvSpPr>
+        <p:spPr>
+          <a:xfrm>
+            <a:off x="693942" y="2099733"/>
+            <a:ext cx="7992858" cy="4026430"/>
+          </a:xfrm>
+        </p:spPr>
+        <p:txBody>
+          <a:bodyPr>
+            <a:normAutofit fontScale="92500" lnSpcReduction="20000"/>
+          </a:bodyPr>
+          <a:lstStyle/>
+          <a:p>
+            <a:pPr>
+              <a:lnSpc>
+                <a:spcPct val="120000"/>
+              </a:lnSpc>
+              <a:spcAft>
+                <a:spcPts val="600"/>
+              </a:spcAft>
+            </a:pPr>
+            <a:r>
+              <a:rPr lang="de-DE" dirty="0" smtClean="0"/>
+              <a:t>Dokumentation zeigt oft nur „einfache“ Beispiele ohne Eingabemodelle</a:t>
+            </a:r>
+          </a:p>
+          <a:p>
+            <a:pPr lvl="1">
+              <a:lnSpc>
+                <a:spcPct val="120000"/>
+              </a:lnSpc>
+              <a:spcAft>
+                <a:spcPts val="600"/>
+              </a:spcAft>
+            </a:pPr>
+            <a:r>
+              <a:rPr lang="de-DE" dirty="0" smtClean="0"/>
+              <a:t>lange Fehlersuche</a:t>
+            </a:r>
+          </a:p>
+          <a:p>
+            <a:pPr lvl="1">
+              <a:lnSpc>
+                <a:spcPct val="120000"/>
+              </a:lnSpc>
+              <a:spcAft>
+                <a:spcPts val="600"/>
+              </a:spcAft>
+            </a:pPr>
+            <a:r>
+              <a:rPr lang="de-DE" dirty="0" smtClean="0"/>
+              <a:t>viel „Ausprobieren“</a:t>
+            </a:r>
+          </a:p>
+          <a:p>
+            <a:pPr>
+              <a:lnSpc>
+                <a:spcPct val="120000"/>
+              </a:lnSpc>
+              <a:spcAft>
+                <a:spcPts val="600"/>
+              </a:spcAft>
+            </a:pPr>
+            <a:r>
+              <a:rPr lang="de-DE" dirty="0" smtClean="0"/>
+              <a:t>Handhabung von Zeilenumbrüchen mit </a:t>
+            </a:r>
+            <a:r>
+              <a:rPr lang="de-DE" dirty="0" err="1" smtClean="0"/>
+              <a:t>Xtend</a:t>
+            </a:r>
+            <a:r>
+              <a:rPr lang="de-DE" dirty="0" smtClean="0"/>
+              <a:t> recht aufwendig</a:t>
+            </a:r>
+          </a:p>
+          <a:p>
+            <a:pPr lvl="1">
+              <a:lnSpc>
+                <a:spcPct val="120000"/>
+              </a:lnSpc>
+              <a:spcAft>
+                <a:spcPts val="600"/>
+              </a:spcAft>
+            </a:pPr>
+            <a:r>
+              <a:rPr lang="de-DE" dirty="0" smtClean="0"/>
+              <a:t>einige unschöne Workarounds</a:t>
+            </a:r>
+          </a:p>
+        </p:txBody>
+      </p:sp>
+      <p:sp>
+        <p:nvSpPr>
+          <p:cNvPr id="4" name="Foliennummernplatzhalter 3"/>
+          <p:cNvSpPr>
+            <a:spLocks noGrp="1"/>
+          </p:cNvSpPr>
+          <p:nvPr>
+            <p:ph type="sldNum" sz="quarter" idx="10"/>
+          </p:nvPr>
+        </p:nvSpPr>
+        <p:spPr/>
+        <p:txBody>
+          <a:bodyPr/>
+          <a:lstStyle/>
+          <a:p>
+            <a:fld id="{1215FA07-EE23-A948-A6ED-56C5FE5A7EE4}" type="slidenum">
+              <a:rPr lang="de-DE" smtClean="0"/>
+              <a:t>10</a:t>
+            </a:fld>
+            <a:endParaRPr lang="de-DE"/>
+          </a:p>
+        </p:txBody>
+      </p:sp>
+    </p:spTree>
+    <p:extLst>
+      <p:ext uri="{BB962C8B-B14F-4D97-AF65-F5344CB8AC3E}">
+        <p14:creationId xmlns:p14="http://schemas.microsoft.com/office/powerpoint/2010/main" val="2815964202"/>
+      </p:ext>
+    </p:extLst>
+  </p:cSld>
+  <p:clrMapOvr>
+    <a:masterClrMapping/>
+  </p:clrMapOvr>
+  <p:timing>
+    <p:tnLst>
+      <p:par>
+        <p:cTn xmlns:p14="http://schemas.microsoft.com/office/powerpoint/2010/main" id="1" dur="indefinite" restart="never" nodeType="tmRoot"/>
+      </p:par>
+    </p:tnLst>
+  </p:timing>
+</p:sld>
+</file>
+
+<file path=ppt/slides/slide11.xml><?xml version="1.0" encoding="utf-8"?>
+<p:sld xmlns:a="http://schemas.openxmlformats.org/drawingml/2006/main" xmlns:r="http://schemas.openxmlformats.org/officeDocument/2006/relationships" xmlns:p="http://schemas.openxmlformats.org/presentationml/2006/main">
+  <p:cSld>
+    <p:spTree>
+      <p:nvGrpSpPr>
+        <p:cNvPr id="1" name=""/>
+        <p:cNvGrpSpPr/>
+        <p:nvPr/>
+      </p:nvGrpSpPr>
+      <p:grpSpPr>
+        <a:xfrm>
+          <a:off x="0" y="0"/>
+          <a:ext cx="0" cy="0"/>
+          <a:chOff x="0" y="0"/>
+          <a:chExt cx="0" cy="0"/>
+        </a:xfrm>
+      </p:grpSpPr>
+      <p:sp>
+        <p:nvSpPr>
+          <p:cNvPr id="2" name="Titel 1"/>
+          <p:cNvSpPr>
+            <a:spLocks noGrp="1"/>
+          </p:cNvSpPr>
+          <p:nvPr>
+            <p:ph type="title"/>
+          </p:nvPr>
+        </p:nvSpPr>
+        <p:spPr/>
+        <p:txBody>
+          <a:bodyPr/>
+          <a:lstStyle/>
+          <a:p>
+            <a:r>
+              <a:rPr lang="de-DE" dirty="0" smtClean="0"/>
+              <a:t>grafischer Editor (Sirius)</a:t>
+            </a:r>
+            <a:endParaRPr lang="de-DE" dirty="0"/>
+          </a:p>
+        </p:txBody>
+      </p:sp>
+    </p:spTree>
+    <p:extLst>
+      <p:ext uri="{BB962C8B-B14F-4D97-AF65-F5344CB8AC3E}">
+        <p14:creationId xmlns:p14="http://schemas.microsoft.com/office/powerpoint/2010/main" val="3791329346"/>
+      </p:ext>
+    </p:extLst>
+  </p:cSld>
+  <p:clrMapOvr>
+    <a:masterClrMapping/>
+  </p:clrMapOvr>
+  <p:timing>
+    <p:tnLst>
+      <p:par>
+        <p:cTn xmlns:p14="http://schemas.microsoft.com/office/powerpoint/2010/main" id="1" dur="indefinite" restart="never" nodeType="tmRoot"/>
+      </p:par>
+    </p:tnLst>
+  </p:timing>
+</p:sld>
+</file>
+
+<file path=ppt/slides/slide12.xml><?xml version="1.0" encoding="utf-8"?>
+<p:sld xmlns:a="http://schemas.openxmlformats.org/drawingml/2006/main" xmlns:r="http://schemas.openxmlformats.org/officeDocument/2006/relationships" xmlns:p="http://schemas.openxmlformats.org/presentationml/2006/main">
+  <p:cSld>
+    <p:spTree>
+      <p:nvGrpSpPr>
+        <p:cNvPr id="1" name=""/>
+        <p:cNvGrpSpPr/>
+        <p:nvPr/>
+      </p:nvGrpSpPr>
+      <p:grpSpPr>
+        <a:xfrm>
+          <a:off x="0" y="0"/>
+          <a:ext cx="0" cy="0"/>
+          <a:chOff x="0" y="0"/>
+          <a:chExt cx="0" cy="0"/>
+        </a:xfrm>
+      </p:grpSpPr>
+      <p:sp>
+        <p:nvSpPr>
+          <p:cNvPr id="3" name="Titel 2"/>
+          <p:cNvSpPr>
+            <a:spLocks noGrp="1"/>
+          </p:cNvSpPr>
+          <p:nvPr>
+            <p:ph type="title"/>
+          </p:nvPr>
+        </p:nvSpPr>
+        <p:spPr/>
+        <p:txBody>
+          <a:bodyPr/>
+          <a:lstStyle/>
+          <a:p>
+            <a:r>
+              <a:rPr lang="de-DE" dirty="0"/>
+              <a:t>g</a:t>
+            </a:r>
+            <a:r>
+              <a:rPr lang="de-DE" dirty="0" smtClean="0"/>
+              <a:t>rafische Darstellung</a:t>
+            </a:r>
+            <a:endParaRPr lang="de-DE" dirty="0"/>
+          </a:p>
+        </p:txBody>
+      </p:sp>
+      <p:pic>
+        <p:nvPicPr>
+          <p:cNvPr id="5" name="Bild 4" descr="Bildschirmfoto 2016-07-18 um 18.41.55.png"/>
+          <p:cNvPicPr>
+            <a:picLocks noChangeAspect="1"/>
+          </p:cNvPicPr>
+          <p:nvPr/>
+        </p:nvPicPr>
+        <p:blipFill>
+          <a:blip r:embed="rId2">
+            <a:extLst>
+              <a:ext uri="{28A0092B-C50C-407E-A947-70E740481C1C}">
+                <a14:useLocalDpi xmlns:a14="http://schemas.microsoft.com/office/drawing/2010/main" val="0"/>
+              </a:ext>
+            </a:extLst>
+          </a:blip>
+          <a:stretch>
+            <a:fillRect/>
+          </a:stretch>
+        </p:blipFill>
+        <p:spPr>
+          <a:xfrm>
+            <a:off x="1221627" y="1039323"/>
+            <a:ext cx="6720107" cy="5327606"/>
+          </a:xfrm>
+          <a:prstGeom prst="rect">
+            <a:avLst/>
+          </a:prstGeom>
+        </p:spPr>
+      </p:pic>
+    </p:spTree>
+    <p:extLst>
+      <p:ext uri="{BB962C8B-B14F-4D97-AF65-F5344CB8AC3E}">
+        <p14:creationId xmlns:p14="http://schemas.microsoft.com/office/powerpoint/2010/main" val="2034413672"/>
+      </p:ext>
+    </p:extLst>
+  </p:cSld>
+  <p:clrMapOvr>
+    <a:masterClrMapping/>
+  </p:clrMapOvr>
+  <p:timing>
+    <p:tnLst>
+      <p:par>
+        <p:cTn xmlns:p14="http://schemas.microsoft.com/office/powerpoint/2010/main" id="1" dur="indefinite" restart="never" nodeType="tmRoot"/>
+      </p:par>
+    </p:tnLst>
+  </p:timing>
+</p:sld>
+</file>
+
+<file path=ppt/slides/slide13.xml><?xml version="1.0" encoding="utf-8"?>
+<p:sld xmlns:a="http://schemas.openxmlformats.org/drawingml/2006/main" xmlns:r="http://schemas.openxmlformats.org/officeDocument/2006/relationships" xmlns:p="http://schemas.openxmlformats.org/presentationml/2006/main">
+  <p:cSld>
+    <p:spTree>
+      <p:nvGrpSpPr>
+        <p:cNvPr id="1" name=""/>
+        <p:cNvGrpSpPr/>
+        <p:nvPr/>
+      </p:nvGrpSpPr>
+      <p:grpSpPr>
+        <a:xfrm>
+          <a:off x="0" y="0"/>
+          <a:ext cx="0" cy="0"/>
+          <a:chOff x="0" y="0"/>
+          <a:chExt cx="0" cy="0"/>
+        </a:xfrm>
+      </p:grpSpPr>
+      <p:sp>
+        <p:nvSpPr>
+          <p:cNvPr id="2" name="Titel 1"/>
+          <p:cNvSpPr>
+            <a:spLocks noGrp="1"/>
+          </p:cNvSpPr>
+          <p:nvPr>
+            <p:ph type="title"/>
+          </p:nvPr>
+        </p:nvSpPr>
+        <p:spPr/>
+        <p:txBody>
+          <a:bodyPr/>
+          <a:lstStyle/>
+          <a:p>
+            <a:r>
+              <a:rPr lang="de-DE" dirty="0" smtClean="0"/>
+              <a:t>Darstellung der Signaturen</a:t>
+            </a:r>
+            <a:endParaRPr lang="de-DE" dirty="0"/>
+          </a:p>
+        </p:txBody>
+      </p:sp>
+      <p:sp>
+        <p:nvSpPr>
+          <p:cNvPr id="4" name="Foliennummernplatzhalter 3"/>
+          <p:cNvSpPr>
+            <a:spLocks noGrp="1"/>
+          </p:cNvSpPr>
+          <p:nvPr>
+            <p:ph type="sldNum" sz="quarter" idx="10"/>
+          </p:nvPr>
+        </p:nvSpPr>
+        <p:spPr/>
+        <p:txBody>
+          <a:bodyPr/>
+          <a:lstStyle/>
+          <a:p>
+            <a:fld id="{1215FA07-EE23-A948-A6ED-56C5FE5A7EE4}" type="slidenum">
+              <a:rPr lang="de-DE" smtClean="0"/>
+              <a:t>13</a:t>
+            </a:fld>
+            <a:endParaRPr lang="de-DE"/>
+          </a:p>
+        </p:txBody>
+      </p:sp>
+      <p:pic>
+        <p:nvPicPr>
+          <p:cNvPr id="5" name="Bild 4" descr="Bildschirmfoto 2016-07-18 um 18.41.55.png"/>
+          <p:cNvPicPr>
+            <a:picLocks noChangeAspect="1"/>
+          </p:cNvPicPr>
+          <p:nvPr/>
+        </p:nvPicPr>
+        <p:blipFill rotWithShape="1">
+          <a:blip r:embed="rId2">
+            <a:extLst>
+              <a:ext uri="{28A0092B-C50C-407E-A947-70E740481C1C}">
+                <a14:useLocalDpi xmlns:a14="http://schemas.microsoft.com/office/drawing/2010/main" val="0"/>
+              </a:ext>
+            </a:extLst>
+          </a:blip>
+          <a:srcRect l="37257" t="59318" r="34773" b="3496"/>
+          <a:stretch/>
+        </p:blipFill>
+        <p:spPr>
+          <a:xfrm>
+            <a:off x="6079068" y="2078863"/>
+            <a:ext cx="2607732" cy="2748692"/>
+          </a:xfrm>
+          <a:prstGeom prst="rect">
+            <a:avLst/>
+          </a:prstGeom>
+        </p:spPr>
+      </p:pic>
+      <p:grpSp>
+        <p:nvGrpSpPr>
+          <p:cNvPr id="17" name="Gruppierung 16"/>
+          <p:cNvGrpSpPr/>
+          <p:nvPr/>
+        </p:nvGrpSpPr>
+        <p:grpSpPr>
+          <a:xfrm>
+            <a:off x="745067" y="2184402"/>
+            <a:ext cx="1774139" cy="2370665"/>
+            <a:chOff x="-30004" y="2184402"/>
+            <a:chExt cx="1774139" cy="2370665"/>
+          </a:xfrm>
+        </p:grpSpPr>
+        <p:sp>
+          <p:nvSpPr>
+            <p:cNvPr id="12" name="Textfeld 11"/>
+            <p:cNvSpPr txBox="1"/>
+            <p:nvPr/>
+          </p:nvSpPr>
+          <p:spPr>
+            <a:xfrm>
+              <a:off x="-30004" y="3032500"/>
+              <a:ext cx="1520137" cy="646331"/>
+            </a:xfrm>
+            <a:prstGeom prst="rect">
+              <a:avLst/>
+            </a:prstGeom>
+            <a:noFill/>
+          </p:spPr>
+          <p:txBody>
+            <a:bodyPr wrap="square" rtlCol="0">
+              <a:spAutoFit/>
+            </a:bodyPr>
+            <a:lstStyle>
+              <a:defPPr>
+                <a:defRPr lang="de-DE"/>
+              </a:defPPr>
+              <a:lvl1pPr>
+                <a:defRPr>
+                  <a:latin typeface="Fira Sans Medium"/>
+                  <a:cs typeface="Fira Sans Medium"/>
+                </a:defRPr>
+              </a:lvl1pPr>
+            </a:lstStyle>
+            <a:p>
+              <a:r>
+                <a:rPr lang="de-DE" dirty="0"/>
+                <a:t>Interface-</a:t>
+              </a:r>
+              <a:r>
+                <a:rPr lang="de-DE" dirty="0">
+                  <a:latin typeface="Fira Mono OT"/>
+                  <a:cs typeface="Fira Mono OT"/>
+                </a:rPr>
+                <a:t>Container</a:t>
+              </a:r>
+            </a:p>
+          </p:txBody>
+        </p:sp>
+        <p:sp>
+          <p:nvSpPr>
+            <p:cNvPr id="13" name="Geschweifte Klammer links 12"/>
+            <p:cNvSpPr/>
+            <p:nvPr/>
+          </p:nvSpPr>
+          <p:spPr>
+            <a:xfrm>
+              <a:off x="1371602" y="2184402"/>
+              <a:ext cx="372533" cy="2370665"/>
+            </a:xfrm>
+            <a:prstGeom prst="leftBrace">
+              <a:avLst/>
+            </a:prstGeom>
+          </p:spPr>
+          <p:style>
+            <a:lnRef idx="2">
+              <a:schemeClr val="accent1"/>
+            </a:lnRef>
+            <a:fillRef idx="0">
+              <a:schemeClr val="accent1"/>
+            </a:fillRef>
+            <a:effectRef idx="1">
+              <a:schemeClr val="accent1"/>
+            </a:effectRef>
+            <a:fontRef idx="minor">
+              <a:schemeClr val="tx1"/>
+            </a:fontRef>
+          </p:style>
+          <p:txBody>
+            <a:bodyPr rtlCol="0" anchor="ctr"/>
+            <a:lstStyle/>
+            <a:p>
+              <a:pPr algn="ctr"/>
+              <a:endParaRPr lang="de-DE"/>
+            </a:p>
+          </p:txBody>
+        </p:sp>
+      </p:grpSp>
+      <p:grpSp>
+        <p:nvGrpSpPr>
+          <p:cNvPr id="18" name="Gruppierung 17"/>
+          <p:cNvGrpSpPr/>
+          <p:nvPr/>
+        </p:nvGrpSpPr>
+        <p:grpSpPr>
+          <a:xfrm>
+            <a:off x="2519206" y="2623235"/>
+            <a:ext cx="1683894" cy="1055595"/>
+            <a:chOff x="60241" y="2184402"/>
+            <a:chExt cx="1683894" cy="1055595"/>
+          </a:xfrm>
+        </p:grpSpPr>
+        <p:sp>
+          <p:nvSpPr>
+            <p:cNvPr id="19" name="Textfeld 18"/>
+            <p:cNvSpPr txBox="1"/>
+            <p:nvPr/>
+          </p:nvSpPr>
+          <p:spPr>
+            <a:xfrm>
+              <a:off x="60241" y="2405967"/>
+              <a:ext cx="1429892" cy="646331"/>
+            </a:xfrm>
+            <a:prstGeom prst="rect">
+              <a:avLst/>
+            </a:prstGeom>
+            <a:noFill/>
+          </p:spPr>
+          <p:txBody>
+            <a:bodyPr wrap="square" rtlCol="0">
+              <a:spAutoFit/>
+            </a:bodyPr>
+            <a:lstStyle>
+              <a:defPPr>
+                <a:defRPr lang="de-DE"/>
+              </a:defPPr>
+              <a:lvl1pPr>
+                <a:defRPr>
+                  <a:latin typeface="Fira Sans Medium"/>
+                  <a:cs typeface="Fira Sans Medium"/>
+                </a:defRPr>
+              </a:lvl1pPr>
+            </a:lstStyle>
+            <a:p>
+              <a:r>
+                <a:rPr lang="de-DE" dirty="0" smtClean="0"/>
+                <a:t>Signatur-</a:t>
+              </a:r>
+              <a:r>
+                <a:rPr lang="de-DE" dirty="0">
+                  <a:latin typeface="Fira Mono OT"/>
+                  <a:cs typeface="Fira Mono OT"/>
+                </a:rPr>
+                <a:t>Container</a:t>
+              </a:r>
+            </a:p>
+          </p:txBody>
+        </p:sp>
+        <p:sp>
+          <p:nvSpPr>
+            <p:cNvPr id="20" name="Geschweifte Klammer links 19"/>
+            <p:cNvSpPr/>
+            <p:nvPr/>
+          </p:nvSpPr>
+          <p:spPr>
+            <a:xfrm>
+              <a:off x="1371602" y="2184402"/>
+              <a:ext cx="372533" cy="1055595"/>
+            </a:xfrm>
+            <a:prstGeom prst="leftBrace">
+              <a:avLst/>
+            </a:prstGeom>
+          </p:spPr>
+          <p:style>
+            <a:lnRef idx="2">
+              <a:schemeClr val="accent1"/>
+            </a:lnRef>
+            <a:fillRef idx="0">
+              <a:schemeClr val="accent1"/>
+            </a:fillRef>
+            <a:effectRef idx="1">
+              <a:schemeClr val="accent1"/>
+            </a:effectRef>
+            <a:fontRef idx="minor">
+              <a:schemeClr val="tx1"/>
+            </a:fontRef>
+          </p:style>
+          <p:txBody>
+            <a:bodyPr rtlCol="0" anchor="ctr"/>
+            <a:lstStyle/>
+            <a:p>
+              <a:pPr algn="ctr"/>
+              <a:endParaRPr lang="de-DE"/>
+            </a:p>
+          </p:txBody>
+        </p:sp>
+      </p:grpSp>
+      <p:grpSp>
+        <p:nvGrpSpPr>
+          <p:cNvPr id="23" name="Gruppierung 22"/>
+          <p:cNvGrpSpPr/>
+          <p:nvPr/>
+        </p:nvGrpSpPr>
+        <p:grpSpPr>
+          <a:xfrm>
+            <a:off x="2519206" y="3729633"/>
+            <a:ext cx="1683894" cy="825434"/>
+            <a:chOff x="60241" y="2184403"/>
+            <a:chExt cx="1683894" cy="825434"/>
+          </a:xfrm>
+        </p:grpSpPr>
+        <p:sp>
+          <p:nvSpPr>
+            <p:cNvPr id="24" name="Textfeld 23"/>
+            <p:cNvSpPr txBox="1"/>
+            <p:nvPr/>
+          </p:nvSpPr>
+          <p:spPr>
+            <a:xfrm>
+              <a:off x="60241" y="2270503"/>
+              <a:ext cx="1429892" cy="646331"/>
+            </a:xfrm>
+            <a:prstGeom prst="rect">
+              <a:avLst/>
+            </a:prstGeom>
+            <a:noFill/>
+          </p:spPr>
+          <p:txBody>
+            <a:bodyPr wrap="square" rtlCol="0">
+              <a:spAutoFit/>
+            </a:bodyPr>
+            <a:lstStyle>
+              <a:defPPr>
+                <a:defRPr lang="de-DE"/>
+              </a:defPPr>
+              <a:lvl1pPr>
+                <a:defRPr>
+                  <a:latin typeface="Fira Sans Medium"/>
+                  <a:cs typeface="Fira Sans Medium"/>
+                </a:defRPr>
+              </a:lvl1pPr>
+            </a:lstStyle>
+            <a:p>
+              <a:r>
+                <a:rPr lang="de-DE" dirty="0" smtClean="0"/>
+                <a:t>Signatur-</a:t>
+              </a:r>
+              <a:r>
+                <a:rPr lang="de-DE" dirty="0">
+                  <a:latin typeface="Fira Mono OT"/>
+                  <a:cs typeface="Fira Mono OT"/>
+                </a:rPr>
+                <a:t>Container</a:t>
+              </a:r>
+            </a:p>
+          </p:txBody>
+        </p:sp>
+        <p:sp>
+          <p:nvSpPr>
+            <p:cNvPr id="25" name="Geschweifte Klammer links 24"/>
+            <p:cNvSpPr/>
+            <p:nvPr/>
+          </p:nvSpPr>
+          <p:spPr>
+            <a:xfrm>
+              <a:off x="1371602" y="2184403"/>
+              <a:ext cx="372533" cy="825434"/>
+            </a:xfrm>
+            <a:prstGeom prst="leftBrace">
+              <a:avLst/>
+            </a:prstGeom>
+          </p:spPr>
+          <p:style>
+            <a:lnRef idx="2">
+              <a:schemeClr val="accent1"/>
+            </a:lnRef>
+            <a:fillRef idx="0">
+              <a:schemeClr val="accent1"/>
+            </a:fillRef>
+            <a:effectRef idx="1">
+              <a:schemeClr val="accent1"/>
+            </a:effectRef>
+            <a:fontRef idx="minor">
+              <a:schemeClr val="tx1"/>
+            </a:fontRef>
+          </p:style>
+          <p:txBody>
+            <a:bodyPr rtlCol="0" anchor="ctr"/>
+            <a:lstStyle/>
+            <a:p>
+              <a:pPr algn="ctr"/>
+              <a:endParaRPr lang="de-DE"/>
+            </a:p>
+          </p:txBody>
+        </p:sp>
+      </p:grpSp>
+      <p:grpSp>
+        <p:nvGrpSpPr>
+          <p:cNvPr id="30" name="Gruppierung 29"/>
+          <p:cNvGrpSpPr/>
+          <p:nvPr/>
+        </p:nvGrpSpPr>
+        <p:grpSpPr>
+          <a:xfrm>
+            <a:off x="4381867" y="3064933"/>
+            <a:ext cx="1565364" cy="646331"/>
+            <a:chOff x="381967" y="2473699"/>
+            <a:chExt cx="1565364" cy="646331"/>
+          </a:xfrm>
+        </p:grpSpPr>
+        <p:sp>
+          <p:nvSpPr>
+            <p:cNvPr id="31" name="Textfeld 30"/>
+            <p:cNvSpPr txBox="1"/>
+            <p:nvPr/>
+          </p:nvSpPr>
+          <p:spPr>
+            <a:xfrm>
+              <a:off x="381967" y="2473699"/>
+              <a:ext cx="1565364" cy="646331"/>
+            </a:xfrm>
+            <a:prstGeom prst="rect">
+              <a:avLst/>
+            </a:prstGeom>
+            <a:noFill/>
+          </p:spPr>
+          <p:txBody>
+            <a:bodyPr wrap="square" rtlCol="0">
+              <a:spAutoFit/>
+            </a:bodyPr>
+            <a:lstStyle>
+              <a:defPPr>
+                <a:defRPr lang="de-DE"/>
+              </a:defPPr>
+              <a:lvl1pPr>
+                <a:defRPr>
+                  <a:latin typeface="Fira Sans Medium"/>
+                  <a:cs typeface="Fira Sans Medium"/>
+                </a:defRPr>
+              </a:lvl1pPr>
+            </a:lstStyle>
+            <a:p>
+              <a:r>
+                <a:rPr lang="de-DE" dirty="0" smtClean="0"/>
+                <a:t>Parameter-</a:t>
+              </a:r>
+              <a:r>
+                <a:rPr lang="de-DE" dirty="0" smtClean="0">
+                  <a:latin typeface="Fira Mono OT"/>
+                  <a:cs typeface="Fira Mono OT"/>
+                </a:rPr>
+                <a:t>Nodes</a:t>
+              </a:r>
+              <a:endParaRPr lang="de-DE" dirty="0">
+                <a:latin typeface="Fira Mono OT"/>
+                <a:cs typeface="Fira Mono OT"/>
+              </a:endParaRPr>
+            </a:p>
+          </p:txBody>
+        </p:sp>
+        <p:sp>
+          <p:nvSpPr>
+            <p:cNvPr id="32" name="Geschweifte Klammer links 31"/>
+            <p:cNvSpPr/>
+            <p:nvPr/>
+          </p:nvSpPr>
+          <p:spPr>
+            <a:xfrm>
+              <a:off x="1744135" y="2592233"/>
+              <a:ext cx="186263" cy="460066"/>
+            </a:xfrm>
+            <a:prstGeom prst="leftBrace">
+              <a:avLst/>
+            </a:prstGeom>
+          </p:spPr>
+          <p:style>
+            <a:lnRef idx="2">
+              <a:schemeClr val="accent1"/>
+            </a:lnRef>
+            <a:fillRef idx="0">
+              <a:schemeClr val="accent1"/>
+            </a:fillRef>
+            <a:effectRef idx="1">
+              <a:schemeClr val="accent1"/>
+            </a:effectRef>
+            <a:fontRef idx="minor">
+              <a:schemeClr val="tx1"/>
+            </a:fontRef>
+          </p:style>
+          <p:txBody>
+            <a:bodyPr rtlCol="0" anchor="ctr"/>
+            <a:lstStyle/>
+            <a:p>
+              <a:pPr algn="ctr"/>
+              <a:endParaRPr lang="de-DE"/>
+            </a:p>
+          </p:txBody>
+        </p:sp>
+      </p:grpSp>
+    </p:spTree>
+    <p:extLst>
+      <p:ext uri="{BB962C8B-B14F-4D97-AF65-F5344CB8AC3E}">
+        <p14:creationId xmlns:p14="http://schemas.microsoft.com/office/powerpoint/2010/main" val="3807551519"/>
+      </p:ext>
+    </p:extLst>
+  </p:cSld>
+  <p:clrMapOvr>
+    <a:masterClrMapping/>
+  </p:clrMapOvr>
+  <p:timing>
+    <p:tnLst>
+      <p:par>
+        <p:cTn xmlns:p14="http://schemas.microsoft.com/office/powerpoint/2010/main" id="1" dur="indefinite" restart="never" nodeType="tmRoot">
+          <p:childTnLst>
+            <p:seq concurrent="1" nextAc="seek">
+              <p:cTn id="2" dur="indefinite" nodeType="mainSeq">
+                <p:childTnLst>
+                  <p:par>
+                    <p:cTn id="3" fill="hold">
+                      <p:stCondLst>
+                        <p:cond delay="indefinite"/>
+                      </p:stCondLst>
+                      <p:childTnLst>
+                        <p:par>
+                          <p:cTn id="4" fill="hold">
+                            <p:stCondLst>
+                              <p:cond delay="0"/>
+                            </p:stCondLst>
+                            <p:childTnLst>
+                              <p:par>
+                                <p:cTn id="5" presetID="1" presetClass="entr" presetSubtype="0" fill="hold" nodeType="clickEffect">
+                                  <p:stCondLst>
+                                    <p:cond delay="0"/>
+                                  </p:stCondLst>
+                                  <p:childTnLst>
+                                    <p:set>
+                                      <p:cBhvr>
+                                        <p:cTn id="6" dur="1" fill="hold">
+                                          <p:stCondLst>
+                                            <p:cond delay="0"/>
+                                          </p:stCondLst>
+                                        </p:cTn>
+                                        <p:tgtEl>
+                                          <p:spTgt spid="17"/>
+                                        </p:tgtEl>
+                                        <p:attrNameLst>
+                                          <p:attrName>style.visibility</p:attrName>
+                                        </p:attrNameLst>
+                                      </p:cBhvr>
+                                      <p:to>
+                                        <p:strVal val="visible"/>
+                                      </p:to>
+                                    </p:set>
+                                  </p:childTnLst>
+                                </p:cTn>
+                              </p:par>
+                            </p:childTnLst>
+                          </p:cTn>
+                        </p:par>
+                      </p:childTnLst>
+                    </p:cTn>
+                  </p:par>
+                  <p:par>
+                    <p:cTn id="7" fill="hold">
+                      <p:stCondLst>
+                        <p:cond delay="indefinite"/>
+                      </p:stCondLst>
+                      <p:childTnLst>
+                        <p:par>
+                          <p:cTn id="8" fill="hold">
+                            <p:stCondLst>
+                              <p:cond delay="0"/>
+                            </p:stCondLst>
+                            <p:childTnLst>
+                              <p:par>
+                                <p:cTn id="9" presetID="1" presetClass="entr" presetSubtype="0" fill="hold" nodeType="clickEffect">
+                                  <p:stCondLst>
+                                    <p:cond delay="0"/>
+                                  </p:stCondLst>
+                                  <p:childTnLst>
+                                    <p:set>
+                                      <p:cBhvr>
+                                        <p:cTn id="10" dur="1" fill="hold">
+                                          <p:stCondLst>
+                                            <p:cond delay="0"/>
+                                          </p:stCondLst>
+                                        </p:cTn>
+                                        <p:tgtEl>
+                                          <p:spTgt spid="18"/>
+                                        </p:tgtEl>
+                                        <p:attrNameLst>
+                                          <p:attrName>style.visibility</p:attrName>
+                                        </p:attrNameLst>
+                                      </p:cBhvr>
+                                      <p:to>
+                                        <p:strVal val="visible"/>
+                                      </p:to>
+                                    </p:set>
+                                  </p:childTnLst>
+                                </p:cTn>
+                              </p:par>
+                              <p:par>
+                                <p:cTn id="11" presetID="1" presetClass="entr" presetSubtype="0" fill="hold" nodeType="withEffect">
+                                  <p:stCondLst>
+                                    <p:cond delay="0"/>
+                                  </p:stCondLst>
+                                  <p:childTnLst>
+                                    <p:set>
+                                      <p:cBhvr>
+                                        <p:cTn id="12" dur="1" fill="hold">
+                                          <p:stCondLst>
+                                            <p:cond delay="0"/>
+                                          </p:stCondLst>
+                                        </p:cTn>
+                                        <p:tgtEl>
+                                          <p:spTgt spid="23"/>
+                                        </p:tgtEl>
+                                        <p:attrNameLst>
+                                          <p:attrName>style.visibility</p:attrName>
+                                        </p:attrNameLst>
+                                      </p:cBhvr>
+                                      <p:to>
+                                        <p:strVal val="visible"/>
+                                      </p:to>
+                                    </p:set>
+                                  </p:childTnLst>
+                                </p:cTn>
+                              </p:par>
+                            </p:childTnLst>
+                          </p:cTn>
+                        </p:par>
+                      </p:childTnLst>
+                    </p:cTn>
+                  </p:par>
+                  <p:par>
+                    <p:cTn id="13" fill="hold">
+                      <p:stCondLst>
+                        <p:cond delay="indefinite"/>
+                      </p:stCondLst>
+                      <p:childTnLst>
+                        <p:par>
+                          <p:cTn id="14" fill="hold">
+                            <p:stCondLst>
+                              <p:cond delay="0"/>
+                            </p:stCondLst>
+                            <p:childTnLst>
+                              <p:par>
+                                <p:cTn id="15" presetID="1" presetClass="entr" presetSubtype="0" fill="hold" nodeType="clickEffect">
+                                  <p:stCondLst>
+                                    <p:cond delay="0"/>
+                                  </p:stCondLst>
+                                  <p:childTnLst>
+                                    <p:set>
+                                      <p:cBhvr>
+                                        <p:cTn id="16" dur="1" fill="hold">
+                                          <p:stCondLst>
+                                            <p:cond delay="0"/>
+                                          </p:stCondLst>
+                                        </p:cTn>
+                                        <p:tgtEl>
+                                          <p:spTgt spid="30"/>
+                                        </p:tgtEl>
+                                        <p:attrNameLst>
+                                          <p:attrName>style.visibility</p:attrName>
+                                        </p:attrNameLst>
+                                      </p:cBhvr>
+                                      <p:to>
+                                        <p:strVal val="visible"/>
+                                      </p:to>
+                                    </p:set>
+                                  </p:childTnLst>
+                                </p:cTn>
+                              </p:par>
+                            </p:childTnLst>
+                          </p:cTn>
+                        </p:par>
+                      </p:childTnLst>
+                    </p:cTn>
+                  </p:par>
+                </p:childTnLst>
+              </p:cTn>
+              <p:prevCondLst>
+                <p:cond evt="onPrev" delay="0">
+                  <p:tgtEl>
+                    <p:sldTgt/>
+                  </p:tgtEl>
+                </p:cond>
+              </p:prevCondLst>
+              <p:nextCondLst>
+                <p:cond evt="onNext" delay="0">
+                  <p:tgtEl>
+                    <p:sldTgt/>
+                  </p:tgtEl>
+                </p:cond>
+              </p:nextCondLst>
+            </p:seq>
+          </p:childTnLst>
+        </p:cTn>
+      </p:par>
+    </p:tnLst>
+  </p:timing>
+</p:sld>
+</file>
+
+<file path=ppt/slides/slide14.xml><?xml version="1.0" encoding="utf-8"?>
+<p:sld xmlns:a="http://schemas.openxmlformats.org/drawingml/2006/main" xmlns:r="http://schemas.openxmlformats.org/officeDocument/2006/relationships" xmlns:p="http://schemas.openxmlformats.org/presentationml/2006/main">
+  <p:cSld>
+    <p:spTree>
+      <p:nvGrpSpPr>
+        <p:cNvPr id="1" name=""/>
+        <p:cNvGrpSpPr/>
+        <p:nvPr/>
+      </p:nvGrpSpPr>
+      <p:grpSpPr>
+        <a:xfrm>
+          <a:off x="0" y="0"/>
+          <a:ext cx="0" cy="0"/>
+          <a:chOff x="0" y="0"/>
+          <a:chExt cx="0" cy="0"/>
+        </a:xfrm>
+      </p:grpSpPr>
+      <p:sp>
+        <p:nvSpPr>
+          <p:cNvPr id="2" name="Titel 1"/>
+          <p:cNvSpPr>
+            <a:spLocks noGrp="1"/>
+          </p:cNvSpPr>
+          <p:nvPr>
+            <p:ph type="title"/>
+          </p:nvPr>
+        </p:nvSpPr>
+        <p:spPr/>
+        <p:txBody>
+          <a:bodyPr/>
+          <a:lstStyle/>
+          <a:p>
+            <a:r>
+              <a:rPr lang="de-DE" dirty="0" smtClean="0">
+                <a:latin typeface="Fira Mono OT"/>
+                <a:cs typeface="Fira Mono OT"/>
+              </a:rPr>
+              <a:t>«</a:t>
+            </a:r>
+            <a:r>
+              <a:rPr lang="de-DE" dirty="0" err="1" smtClean="0">
+                <a:latin typeface="Fira Mono OT"/>
+                <a:cs typeface="Fira Mono OT"/>
+              </a:rPr>
+              <a:t>requires</a:t>
+            </a:r>
+            <a:r>
+              <a:rPr lang="de-DE" dirty="0" smtClean="0">
+                <a:latin typeface="Fira Mono OT"/>
+                <a:cs typeface="Fira Mono OT"/>
+              </a:rPr>
+              <a:t>» </a:t>
+            </a:r>
+            <a:r>
+              <a:rPr lang="de-DE" dirty="0" smtClean="0"/>
+              <a:t>und </a:t>
+            </a:r>
+            <a:r>
+              <a:rPr lang="de-DE" dirty="0" smtClean="0">
+                <a:latin typeface="Fira Mono OT"/>
+                <a:cs typeface="Fira Mono OT"/>
+              </a:rPr>
+              <a:t>«</a:t>
+            </a:r>
+            <a:r>
+              <a:rPr lang="de-DE" dirty="0" err="1" smtClean="0">
+                <a:latin typeface="Fira Mono OT"/>
+                <a:cs typeface="Fira Mono OT"/>
+              </a:rPr>
+              <a:t>provides</a:t>
+            </a:r>
+            <a:r>
+              <a:rPr lang="de-DE" dirty="0" smtClean="0">
+                <a:latin typeface="Fira Mono OT"/>
+                <a:cs typeface="Fira Mono OT"/>
+              </a:rPr>
+              <a:t>» </a:t>
+            </a:r>
+            <a:r>
+              <a:rPr lang="de-DE" dirty="0" smtClean="0"/>
+              <a:t>Beziehungen</a:t>
+            </a:r>
+            <a:endParaRPr lang="de-DE" dirty="0"/>
+          </a:p>
+        </p:txBody>
+      </p:sp>
+      <p:sp>
+        <p:nvSpPr>
+          <p:cNvPr id="4" name="Foliennummernplatzhalter 3"/>
+          <p:cNvSpPr>
+            <a:spLocks noGrp="1"/>
+          </p:cNvSpPr>
+          <p:nvPr>
+            <p:ph type="sldNum" sz="quarter" idx="10"/>
+          </p:nvPr>
+        </p:nvSpPr>
+        <p:spPr/>
+        <p:txBody>
+          <a:bodyPr/>
+          <a:lstStyle/>
+          <a:p>
+            <a:fld id="{1215FA07-EE23-A948-A6ED-56C5FE5A7EE4}" type="slidenum">
+              <a:rPr lang="de-DE" smtClean="0"/>
+              <a:t>14</a:t>
+            </a:fld>
+            <a:endParaRPr lang="de-DE"/>
+          </a:p>
+        </p:txBody>
+      </p:sp>
+      <p:pic>
+        <p:nvPicPr>
+          <p:cNvPr id="5" name="Bild 4" descr="Bildschirmfoto 2016-07-18 um 18.41.55.png"/>
+          <p:cNvPicPr>
+            <a:picLocks noChangeAspect="1"/>
+          </p:cNvPicPr>
+          <p:nvPr/>
+        </p:nvPicPr>
+        <p:blipFill rotWithShape="1">
+          <a:blip r:embed="rId2">
+            <a:extLst>
+              <a:ext uri="{28A0092B-C50C-407E-A947-70E740481C1C}">
+                <a14:useLocalDpi xmlns:a14="http://schemas.microsoft.com/office/drawing/2010/main" val="0"/>
+              </a:ext>
+            </a:extLst>
+          </a:blip>
+          <a:srcRect t="9228" r="33803"/>
+          <a:stretch/>
+        </p:blipFill>
+        <p:spPr>
+          <a:xfrm>
+            <a:off x="931333" y="1676400"/>
+            <a:ext cx="4758266" cy="5172742"/>
+          </a:xfrm>
+          <a:prstGeom prst="corner">
+            <a:avLst>
+              <a:gd name="adj1" fmla="val 51834"/>
+              <a:gd name="adj2" fmla="val 42195"/>
+            </a:avLst>
+          </a:prstGeom>
+        </p:spPr>
+      </p:pic>
+      <p:grpSp>
+        <p:nvGrpSpPr>
+          <p:cNvPr id="8" name="Gruppierung 7"/>
+          <p:cNvGrpSpPr/>
+          <p:nvPr/>
+        </p:nvGrpSpPr>
+        <p:grpSpPr>
+          <a:xfrm>
+            <a:off x="4978400" y="1238720"/>
+            <a:ext cx="3928535" cy="3011795"/>
+            <a:chOff x="4978400" y="1238720"/>
+            <a:chExt cx="3928535" cy="3011795"/>
+          </a:xfrm>
+        </p:grpSpPr>
+        <p:pic>
+          <p:nvPicPr>
+            <p:cNvPr id="6" name="Bild 5" descr="Bildschirmfoto 2016-07-18 um 19.27.08.png"/>
+            <p:cNvPicPr>
+              <a:picLocks noChangeAspect="1"/>
+            </p:cNvPicPr>
+            <p:nvPr/>
+          </p:nvPicPr>
+          <p:blipFill rotWithShape="1">
+            <a:blip r:embed="rId3">
+              <a:extLst>
+                <a:ext uri="{28A0092B-C50C-407E-A947-70E740481C1C}">
+                  <a14:useLocalDpi xmlns:a14="http://schemas.microsoft.com/office/drawing/2010/main" val="0"/>
+                </a:ext>
+              </a:extLst>
+            </a:blip>
+            <a:srcRect l="10186" r="14258"/>
+            <a:stretch/>
+          </p:blipFill>
+          <p:spPr>
+            <a:xfrm>
+              <a:off x="4978400" y="1238720"/>
+              <a:ext cx="3928535" cy="2642463"/>
+            </a:xfrm>
+            <a:prstGeom prst="rect">
+              <a:avLst/>
+            </a:prstGeom>
+            <a:ln>
+              <a:solidFill>
+                <a:schemeClr val="bg1">
+                  <a:lumMod val="65000"/>
+                </a:schemeClr>
+              </a:solidFill>
+            </a:ln>
+          </p:spPr>
+        </p:pic>
+        <p:sp>
+          <p:nvSpPr>
+            <p:cNvPr id="7" name="Textfeld 6"/>
+            <p:cNvSpPr txBox="1"/>
+            <p:nvPr/>
+          </p:nvSpPr>
+          <p:spPr>
+            <a:xfrm>
+              <a:off x="7337276" y="3881183"/>
+              <a:ext cx="1569659" cy="369332"/>
+            </a:xfrm>
+            <a:prstGeom prst="rect">
+              <a:avLst/>
+            </a:prstGeom>
+            <a:noFill/>
+          </p:spPr>
+          <p:txBody>
+            <a:bodyPr wrap="none" rtlCol="0">
+              <a:spAutoFit/>
+            </a:bodyPr>
+            <a:lstStyle/>
+            <a:p>
+              <a:pPr algn="r"/>
+              <a:r>
+                <a:rPr lang="de-DE" dirty="0" smtClean="0">
+                  <a:solidFill>
+                    <a:schemeClr val="bg1">
+                      <a:lumMod val="50000"/>
+                    </a:schemeClr>
+                  </a:solidFill>
+                  <a:latin typeface="Fira Mono OT"/>
+                  <a:cs typeface="Fira Mono OT"/>
+                </a:rPr>
+                <a:t>Metamodell</a:t>
+              </a:r>
+              <a:endParaRPr lang="de-DE" dirty="0">
+                <a:solidFill>
+                  <a:schemeClr val="bg1">
+                    <a:lumMod val="50000"/>
+                  </a:schemeClr>
+                </a:solidFill>
+                <a:latin typeface="Fira Mono OT"/>
+                <a:cs typeface="Fira Mono OT"/>
+              </a:endParaRPr>
+            </a:p>
+          </p:txBody>
+        </p:sp>
+      </p:grpSp>
+      <p:grpSp>
+        <p:nvGrpSpPr>
+          <p:cNvPr id="16" name="Gruppierung 15"/>
+          <p:cNvGrpSpPr/>
+          <p:nvPr/>
+        </p:nvGrpSpPr>
+        <p:grpSpPr>
+          <a:xfrm>
+            <a:off x="1439333" y="3132667"/>
+            <a:ext cx="5897943" cy="2201334"/>
+            <a:chOff x="1439333" y="3132667"/>
+            <a:chExt cx="5897943" cy="2201334"/>
+          </a:xfrm>
+        </p:grpSpPr>
+        <p:cxnSp>
+          <p:nvCxnSpPr>
+            <p:cNvPr id="10" name="Gerade Verbindung 9"/>
+            <p:cNvCxnSpPr/>
+            <p:nvPr/>
+          </p:nvCxnSpPr>
+          <p:spPr>
+            <a:xfrm flipV="1">
+              <a:off x="1439333" y="3132667"/>
+              <a:ext cx="3962400" cy="948266"/>
+            </a:xfrm>
+            <a:prstGeom prst="line">
+              <a:avLst/>
+            </a:prstGeom>
+            <a:ln>
+              <a:prstDash val="dash"/>
+            </a:ln>
+          </p:spPr>
+          <p:style>
+            <a:lnRef idx="2">
+              <a:schemeClr val="accent1"/>
+            </a:lnRef>
+            <a:fillRef idx="0">
+              <a:schemeClr val="accent1"/>
+            </a:fillRef>
+            <a:effectRef idx="1">
+              <a:schemeClr val="accent1"/>
+            </a:effectRef>
+            <a:fontRef idx="minor">
+              <a:schemeClr val="tx1"/>
+            </a:fontRef>
+          </p:style>
+        </p:cxnSp>
+        <p:cxnSp>
+          <p:nvCxnSpPr>
+            <p:cNvPr id="11" name="Gerade Verbindung 10"/>
+            <p:cNvCxnSpPr/>
+            <p:nvPr/>
+          </p:nvCxnSpPr>
+          <p:spPr>
+            <a:xfrm flipV="1">
+              <a:off x="3098800" y="3132667"/>
+              <a:ext cx="4238476" cy="2201334"/>
+            </a:xfrm>
+            <a:prstGeom prst="line">
+              <a:avLst/>
+            </a:prstGeom>
+            <a:ln>
+              <a:prstDash val="dash"/>
+            </a:ln>
+          </p:spPr>
+          <p:style>
+            <a:lnRef idx="2">
+              <a:schemeClr val="accent1"/>
+            </a:lnRef>
+            <a:fillRef idx="0">
+              <a:schemeClr val="accent1"/>
+            </a:fillRef>
+            <a:effectRef idx="1">
+              <a:schemeClr val="accent1"/>
+            </a:effectRef>
+            <a:fontRef idx="minor">
+              <a:schemeClr val="tx1"/>
+            </a:fontRef>
+          </p:style>
+        </p:cxnSp>
+      </p:grpSp>
+    </p:spTree>
+    <p:extLst>
+      <p:ext uri="{BB962C8B-B14F-4D97-AF65-F5344CB8AC3E}">
+        <p14:creationId xmlns:p14="http://schemas.microsoft.com/office/powerpoint/2010/main" val="1417512992"/>
+      </p:ext>
+    </p:extLst>
+  </p:cSld>
+  <p:clrMapOvr>
+    <a:masterClrMapping/>
+  </p:clrMapOvr>
+  <p:timing>
+    <p:tnLst>
+      <p:par>
+        <p:cTn xmlns:p14="http://schemas.microsoft.com/office/powerpoint/2010/main" id="1" dur="indefinite" restart="never" nodeType="tmRoot">
+          <p:childTnLst>
+            <p:seq concurrent="1" nextAc="seek">
+              <p:cTn id="2" dur="indefinite" nodeType="mainSeq">
+                <p:childTnLst>
+                  <p:par>
+                    <p:cTn id="3" fill="hold">
+                      <p:stCondLst>
+                        <p:cond delay="indefinite"/>
+                      </p:stCondLst>
+                      <p:childTnLst>
+                        <p:par>
+                          <p:cTn id="4" fill="hold">
+                            <p:stCondLst>
+                              <p:cond delay="0"/>
+                            </p:stCondLst>
+                            <p:childTnLst>
+                              <p:par>
+                                <p:cTn id="5" presetID="1" presetClass="entr" presetSubtype="0" fill="hold" nodeType="clickEffect">
+                                  <p:stCondLst>
+                                    <p:cond delay="0"/>
+                                  </p:stCondLst>
+                                  <p:childTnLst>
+                                    <p:set>
+                                      <p:cBhvr>
+                                        <p:cTn id="6" dur="1" fill="hold">
+                                          <p:stCondLst>
+                                            <p:cond delay="0"/>
+                                          </p:stCondLst>
+                                        </p:cTn>
+                                        <p:tgtEl>
+                                          <p:spTgt spid="8"/>
+                                        </p:tgtEl>
+                                        <p:attrNameLst>
+                                          <p:attrName>style.visibility</p:attrName>
+                                        </p:attrNameLst>
+                                      </p:cBhvr>
+                                      <p:to>
+                                        <p:strVal val="visible"/>
+                                      </p:to>
+                                    </p:set>
+                                  </p:childTnLst>
+                                </p:cTn>
+                              </p:par>
+                            </p:childTnLst>
+                          </p:cTn>
+                        </p:par>
+                      </p:childTnLst>
+                    </p:cTn>
+                  </p:par>
+                  <p:par>
+                    <p:cTn id="7" fill="hold">
+                      <p:stCondLst>
+                        <p:cond delay="indefinite"/>
+                      </p:stCondLst>
+                      <p:childTnLst>
+                        <p:par>
+                          <p:cTn id="8" fill="hold">
+                            <p:stCondLst>
+                              <p:cond delay="0"/>
+                            </p:stCondLst>
+                            <p:childTnLst>
+                              <p:par>
+                                <p:cTn id="9" presetID="1" presetClass="entr" presetSubtype="0" fill="hold" nodeType="clickEffect">
+                                  <p:stCondLst>
+                                    <p:cond delay="0"/>
+                                  </p:stCondLst>
+                                  <p:childTnLst>
+                                    <p:set>
+                                      <p:cBhvr>
+                                        <p:cTn id="10" dur="1" fill="hold">
+                                          <p:stCondLst>
+                                            <p:cond delay="0"/>
+                                          </p:stCondLst>
+                                        </p:cTn>
+                                        <p:tgtEl>
+                                          <p:spTgt spid="16"/>
+                                        </p:tgtEl>
+                                        <p:attrNameLst>
+                                          <p:attrName>style.visibility</p:attrName>
+                                        </p:attrNameLst>
+                                      </p:cBhvr>
+                                      <p:to>
+                                        <p:strVal val="visible"/>
+                                      </p:to>
+                                    </p:set>
+                                  </p:childTnLst>
+                                </p:cTn>
+                              </p:par>
+                            </p:childTnLst>
+                          </p:cTn>
+                        </p:par>
+                      </p:childTnLst>
+                    </p:cTn>
+                  </p:par>
+                </p:childTnLst>
+              </p:cTn>
+              <p:prevCondLst>
+                <p:cond evt="onPrev" delay="0">
+                  <p:tgtEl>
+                    <p:sldTgt/>
+                  </p:tgtEl>
+                </p:cond>
+              </p:prevCondLst>
+              <p:nextCondLst>
+                <p:cond evt="onNext" delay="0">
+                  <p:tgtEl>
+                    <p:sldTgt/>
+                  </p:tgtEl>
+                </p:cond>
+              </p:nextCondLst>
+            </p:seq>
+          </p:childTnLst>
+        </p:cTn>
+      </p:par>
+    </p:tnLst>
+  </p:timing>
+</p:sld>
+</file>
+
+<file path=ppt/slides/slide15.xml><?xml version="1.0" encoding="utf-8"?>
+<p:sld xmlns:a="http://schemas.openxmlformats.org/drawingml/2006/main" xmlns:r="http://schemas.openxmlformats.org/officeDocument/2006/relationships" xmlns:p="http://schemas.openxmlformats.org/presentationml/2006/main">
+  <p:cSld>
+    <p:spTree>
+      <p:nvGrpSpPr>
+        <p:cNvPr id="1" name=""/>
+        <p:cNvGrpSpPr/>
+        <p:nvPr/>
+      </p:nvGrpSpPr>
+      <p:grpSpPr>
+        <a:xfrm>
+          <a:off x="0" y="0"/>
+          <a:ext cx="0" cy="0"/>
+          <a:chOff x="0" y="0"/>
+          <a:chExt cx="0" cy="0"/>
+        </a:xfrm>
+      </p:grpSpPr>
+      <p:sp>
+        <p:nvSpPr>
+          <p:cNvPr id="2" name="Titel 1"/>
+          <p:cNvSpPr>
+            <a:spLocks noGrp="1"/>
+          </p:cNvSpPr>
+          <p:nvPr>
+            <p:ph type="title"/>
+          </p:nvPr>
+        </p:nvSpPr>
+        <p:spPr/>
+        <p:txBody>
+          <a:bodyPr/>
+          <a:lstStyle/>
+          <a:p>
+            <a:r>
+              <a:rPr lang="de-DE" dirty="0" smtClean="0"/>
+              <a:t>Was haben wir bei dieser Aufgabe gelernt?</a:t>
+            </a:r>
+            <a:endParaRPr lang="de-DE" dirty="0"/>
+          </a:p>
+        </p:txBody>
+      </p:sp>
+      <p:sp>
+        <p:nvSpPr>
+          <p:cNvPr id="3" name="Inhaltsplatzhalter 2"/>
+          <p:cNvSpPr>
+            <a:spLocks noGrp="1"/>
+          </p:cNvSpPr>
+          <p:nvPr>
+            <p:ph idx="1"/>
+          </p:nvPr>
+        </p:nvSpPr>
+        <p:spPr>
+          <a:xfrm>
+            <a:off x="693942" y="2099733"/>
+            <a:ext cx="7992858" cy="4026430"/>
+          </a:xfrm>
+        </p:spPr>
+        <p:txBody>
+          <a:bodyPr>
+            <a:normAutofit fontScale="70000" lnSpcReduction="20000"/>
+          </a:bodyPr>
+          <a:lstStyle/>
+          <a:p>
+            <a:pPr>
+              <a:lnSpc>
+                <a:spcPct val="120000"/>
+              </a:lnSpc>
+              <a:spcAft>
+                <a:spcPts val="600"/>
+              </a:spcAft>
+            </a:pPr>
+            <a:r>
+              <a:rPr lang="de-DE" dirty="0"/>
+              <a:t>e</a:t>
+            </a:r>
+            <a:r>
+              <a:rPr lang="de-DE" dirty="0" smtClean="0"/>
+              <a:t>igenes Layout der Elemente innerhalb eines Containers nur sehr schwer möglich</a:t>
+            </a:r>
+          </a:p>
+          <a:p>
+            <a:pPr lvl="1">
+              <a:lnSpc>
+                <a:spcPct val="120000"/>
+              </a:lnSpc>
+              <a:spcAft>
+                <a:spcPts val="600"/>
+              </a:spcAft>
+            </a:pPr>
+            <a:r>
+              <a:rPr lang="de-DE" dirty="0" smtClean="0">
+                <a:solidFill>
+                  <a:schemeClr val="bg1">
+                    <a:lumMod val="50000"/>
+                  </a:schemeClr>
+                </a:solidFill>
+              </a:rPr>
+              <a:t>Parameterliste der Signaturen</a:t>
+            </a:r>
+          </a:p>
+          <a:p>
+            <a:pPr>
+              <a:lnSpc>
+                <a:spcPct val="120000"/>
+              </a:lnSpc>
+              <a:spcAft>
+                <a:spcPts val="600"/>
+              </a:spcAft>
+            </a:pPr>
+            <a:r>
+              <a:rPr lang="de-DE" dirty="0" smtClean="0"/>
+              <a:t>Auswählen des richtigen Kontexts / der richtigen Elemente oft schwer</a:t>
+            </a:r>
+          </a:p>
+          <a:p>
+            <a:pPr lvl="1">
+              <a:lnSpc>
+                <a:spcPct val="120000"/>
+              </a:lnSpc>
+              <a:spcAft>
+                <a:spcPts val="600"/>
+              </a:spcAft>
+            </a:pPr>
+            <a:r>
+              <a:rPr lang="de-DE" dirty="0" err="1" smtClean="0">
+                <a:solidFill>
+                  <a:srgbClr val="7F7F7F"/>
+                </a:solidFill>
+              </a:rPr>
+              <a:t>Semantic</a:t>
+            </a:r>
+            <a:r>
+              <a:rPr lang="de-DE" dirty="0" smtClean="0">
+                <a:solidFill>
+                  <a:srgbClr val="7F7F7F"/>
+                </a:solidFill>
+              </a:rPr>
+              <a:t> </a:t>
+            </a:r>
+            <a:r>
+              <a:rPr lang="de-DE" dirty="0" err="1" smtClean="0">
+                <a:solidFill>
+                  <a:srgbClr val="7F7F7F"/>
+                </a:solidFill>
+              </a:rPr>
+              <a:t>Candidates</a:t>
+            </a:r>
+            <a:r>
+              <a:rPr lang="de-DE" dirty="0" smtClean="0">
+                <a:solidFill>
+                  <a:srgbClr val="7F7F7F"/>
+                </a:solidFill>
+              </a:rPr>
+              <a:t> Expression</a:t>
+            </a:r>
+          </a:p>
+          <a:p>
+            <a:pPr lvl="1">
+              <a:lnSpc>
+                <a:spcPct val="120000"/>
+              </a:lnSpc>
+              <a:spcAft>
+                <a:spcPts val="600"/>
+              </a:spcAft>
+            </a:pPr>
+            <a:r>
+              <a:rPr lang="de-DE" dirty="0" smtClean="0">
+                <a:solidFill>
+                  <a:srgbClr val="7F7F7F"/>
+                </a:solidFill>
+              </a:rPr>
+              <a:t>AQL</a:t>
+            </a:r>
+          </a:p>
+          <a:p>
+            <a:pPr>
+              <a:lnSpc>
+                <a:spcPct val="120000"/>
+              </a:lnSpc>
+              <a:spcAft>
+                <a:spcPts val="600"/>
+              </a:spcAft>
+            </a:pPr>
+            <a:r>
+              <a:rPr lang="de-DE" dirty="0" smtClean="0"/>
+              <a:t>Dokumentation nicht sehr umfangreich</a:t>
+            </a:r>
+          </a:p>
+          <a:p>
+            <a:pPr>
+              <a:lnSpc>
+                <a:spcPct val="120000"/>
+              </a:lnSpc>
+              <a:spcAft>
+                <a:spcPts val="600"/>
+              </a:spcAft>
+            </a:pPr>
+            <a:r>
+              <a:rPr lang="de-DE" dirty="0" smtClean="0"/>
+              <a:t>Wie so oft: Wenn es funktioniert eine nützliche Sache ;-)</a:t>
+            </a:r>
+            <a:endParaRPr lang="de-DE" dirty="0"/>
+          </a:p>
+        </p:txBody>
+      </p:sp>
+      <p:sp>
+        <p:nvSpPr>
+          <p:cNvPr id="4" name="Foliennummernplatzhalter 3"/>
+          <p:cNvSpPr>
+            <a:spLocks noGrp="1"/>
+          </p:cNvSpPr>
+          <p:nvPr>
+            <p:ph type="sldNum" sz="quarter" idx="10"/>
+          </p:nvPr>
+        </p:nvSpPr>
+        <p:spPr/>
+        <p:txBody>
+          <a:bodyPr/>
+          <a:lstStyle/>
+          <a:p>
+            <a:fld id="{1215FA07-EE23-A948-A6ED-56C5FE5A7EE4}" type="slidenum">
+              <a:rPr lang="de-DE" smtClean="0"/>
+              <a:t>15</a:t>
+            </a:fld>
+            <a:endParaRPr lang="de-DE"/>
+          </a:p>
+        </p:txBody>
+      </p:sp>
+    </p:spTree>
+    <p:extLst>
+      <p:ext uri="{BB962C8B-B14F-4D97-AF65-F5344CB8AC3E}">
+        <p14:creationId xmlns:p14="http://schemas.microsoft.com/office/powerpoint/2010/main" val="1135353530"/>
+      </p:ext>
+    </p:extLst>
+  </p:cSld>
+  <p:clrMapOvr>
+    <a:masterClrMapping/>
+  </p:clrMapOvr>
+  <p:timing>
+    <p:tnLst>
+      <p:par>
+        <p:cTn xmlns:p14="http://schemas.microsoft.com/office/powerpoint/2010/main" id="1" dur="indefinite" restart="never" nodeType="tmRoot"/>
+      </p:par>
+    </p:tnLst>
+  </p:timing>
+</p:sld>
+</file>
+
+<file path=ppt/slides/slide16.xml><?xml version="1.0" encoding="utf-8"?>
+<p:sld xmlns:a="http://schemas.openxmlformats.org/drawingml/2006/main" xmlns:r="http://schemas.openxmlformats.org/officeDocument/2006/relationships" xmlns:p="http://schemas.openxmlformats.org/presentationml/2006/main">
+  <p:cSld>
+    <p:spTree>
+      <p:nvGrpSpPr>
+        <p:cNvPr id="1" name=""/>
+        <p:cNvGrpSpPr/>
+        <p:nvPr/>
+      </p:nvGrpSpPr>
+      <p:grpSpPr>
+        <a:xfrm>
+          <a:off x="0" y="0"/>
+          <a:ext cx="0" cy="0"/>
+          <a:chOff x="0" y="0"/>
+          <a:chExt cx="0" cy="0"/>
+        </a:xfrm>
+      </p:grpSpPr>
+      <p:sp>
+        <p:nvSpPr>
+          <p:cNvPr id="3" name="Titel 2"/>
+          <p:cNvSpPr>
+            <a:spLocks noGrp="1"/>
+          </p:cNvSpPr>
+          <p:nvPr>
+            <p:ph type="title"/>
+          </p:nvPr>
+        </p:nvSpPr>
+        <p:spPr/>
+        <p:txBody>
+          <a:bodyPr/>
+          <a:lstStyle/>
+          <a:p>
+            <a:r>
+              <a:rPr lang="de-DE" dirty="0" smtClean="0"/>
+              <a:t>Vielen Dank für die Aufmerksamkeit!</a:t>
+            </a:r>
+            <a:endParaRPr lang="de-DE" dirty="0"/>
+          </a:p>
+        </p:txBody>
+      </p:sp>
+    </p:spTree>
+    <p:extLst>
+      <p:ext uri="{BB962C8B-B14F-4D97-AF65-F5344CB8AC3E}">
+        <p14:creationId xmlns:p14="http://schemas.microsoft.com/office/powerpoint/2010/main" val="3593891134"/>
+      </p:ext>
+    </p:extLst>
+  </p:cSld>
+  <p:clrMapOvr>
+    <a:masterClrMapping/>
+  </p:clrMapOvr>
+  <p:timing>
+    <p:tnLst>
+      <p:par>
+        <p:cTn xmlns:p14="http://schemas.microsoft.com/office/powerpoint/2010/main" id="1" dur="indefinite" restart="never" nodeType="tmRoot"/>
+      </p:par>
+    </p:tnLst>
+  </p:timing>
+</p:sld>
+</file>
+
 <file path=ppt/slides/slide2.xml><?xml version="1.0" encoding="utf-8"?>
 <p:sld xmlns:a="http://schemas.openxmlformats.org/drawingml/2006/main" xmlns:r="http://schemas.openxmlformats.org/officeDocument/2006/relationships" xmlns:p="http://schemas.openxmlformats.org/presentationml/2006/main">
   <p:cSld>
@@ -3526,6 +5337,13 @@
   <p:clrMapOvr>
     <a:masterClrMapping/>
   </p:clrMapOvr>
+  <p:timing>
+    <p:tnLst>
+      <p:par>
+        <p:cTn xmlns:p14="http://schemas.microsoft.com/office/powerpoint/2010/main" id="1" dur="indefinite" restart="never" nodeType="tmRoot"/>
+      </p:par>
+    </p:tnLst>
+  </p:timing>
 </p:sld>
 </file>
 
@@ -3579,6 +5397,13 @@
   <p:clrMapOvr>
     <a:masterClrMapping/>
   </p:clrMapOvr>
+  <p:timing>
+    <p:tnLst>
+      <p:par>
+        <p:cTn xmlns:p14="http://schemas.microsoft.com/office/powerpoint/2010/main" id="1" dur="indefinite" restart="never" nodeType="tmRoot"/>
+      </p:par>
+    </p:tnLst>
+  </p:timing>
 </p:sld>
 </file>
 
@@ -3632,6 +5457,13 @@
   <p:clrMapOvr>
     <a:masterClrMapping/>
   </p:clrMapOvr>
+  <p:timing>
+    <p:tnLst>
+      <p:par>
+        <p:cTn xmlns:p14="http://schemas.microsoft.com/office/powerpoint/2010/main" id="1" dur="indefinite" restart="never" nodeType="tmRoot"/>
+      </p:par>
+    </p:tnLst>
+  </p:timing>
 </p:sld>
 </file>
 
@@ -3654,7 +5486,7 @@
       </p:grpSpPr>
       <p:sp>
         <p:nvSpPr>
-          <p:cNvPr id="2" name="Titel 1"/>
+          <p:cNvPr id="3" name="Titel 2"/>
           <p:cNvSpPr>
             <a:spLocks noGrp="1"/>
           </p:cNvSpPr>
@@ -3669,16 +5501,164 @@
           <a:p>
             <a:r>
               <a:rPr lang="de-DE" dirty="0" smtClean="0"/>
-              <a:t>grafischer Editor (Sirius)</a:t>
+              <a:t>Probleme mit MWE2-Workflow</a:t>
             </a:r>
             <a:endParaRPr lang="de-DE" dirty="0"/>
+          </a:p>
+        </p:txBody>
+      </p:sp>
+      <p:sp>
+        <p:nvSpPr>
+          <p:cNvPr id="4" name="Inhaltsplatzhalter 3"/>
+          <p:cNvSpPr>
+            <a:spLocks noGrp="1"/>
+          </p:cNvSpPr>
+          <p:nvPr>
+            <p:ph idx="1"/>
+          </p:nvPr>
+        </p:nvSpPr>
+        <p:spPr/>
+        <p:txBody>
+          <a:bodyPr vert="horz" lIns="91440" tIns="45720" rIns="91440" bIns="45720" rtlCol="0">
+            <a:normAutofit/>
+          </a:bodyPr>
+          <a:lstStyle/>
+          <a:p>
+            <a:pPr>
+              <a:lnSpc>
+                <a:spcPct val="120000"/>
+              </a:lnSpc>
+              <a:spcAft>
+                <a:spcPts val="600"/>
+              </a:spcAft>
+            </a:pPr>
+            <a:r>
+              <a:rPr lang="de-DE" dirty="0"/>
+              <a:t>OCL muss in </a:t>
+            </a:r>
+            <a:r>
+              <a:rPr lang="de-DE" dirty="0" err="1"/>
+              <a:t>Standalone</a:t>
+            </a:r>
+            <a:r>
+              <a:rPr lang="de-DE" dirty="0"/>
+              <a:t> Umgebung manuell initialisiert werden</a:t>
+            </a:r>
+          </a:p>
+          <a:p>
+            <a:pPr lvl="1">
+              <a:lnSpc>
+                <a:spcPct val="120000"/>
+              </a:lnSpc>
+              <a:spcAft>
+                <a:spcPts val="600"/>
+              </a:spcAft>
+            </a:pPr>
+            <a:r>
+              <a:rPr lang="de-DE" dirty="0">
+                <a:solidFill>
+                  <a:schemeClr val="bg1">
+                    <a:lumMod val="50000"/>
+                  </a:schemeClr>
+                </a:solidFill>
+              </a:rPr>
+              <a:t>Ort der Initialisierung geht aus Dokumentation nicht genau hervor</a:t>
+            </a:r>
+          </a:p>
+          <a:p>
+            <a:pPr>
+              <a:lnSpc>
+                <a:spcPct val="120000"/>
+              </a:lnSpc>
+              <a:spcAft>
+                <a:spcPts val="600"/>
+              </a:spcAft>
+            </a:pPr>
+            <a:r>
+              <a:rPr lang="de-DE" dirty="0"/>
+              <a:t>Workflow lässt sich nicht ausführen</a:t>
+            </a:r>
+          </a:p>
+          <a:p>
+            <a:pPr lvl="1">
+              <a:lnSpc>
+                <a:spcPct val="120000"/>
+              </a:lnSpc>
+              <a:spcAft>
+                <a:spcPts val="600"/>
+              </a:spcAft>
+            </a:pPr>
+            <a:r>
+              <a:rPr lang="de-DE" dirty="0">
+                <a:solidFill>
+                  <a:schemeClr val="bg1">
+                    <a:lumMod val="50000"/>
+                  </a:schemeClr>
+                </a:solidFill>
+              </a:rPr>
+              <a:t>OCL </a:t>
+            </a:r>
+            <a:r>
+              <a:rPr lang="de-DE" dirty="0" err="1">
+                <a:solidFill>
+                  <a:schemeClr val="bg1">
+                    <a:lumMod val="50000"/>
+                  </a:schemeClr>
+                </a:solidFill>
+              </a:rPr>
+              <a:t>Constraints</a:t>
+            </a:r>
+            <a:r>
+              <a:rPr lang="de-DE" dirty="0">
+                <a:solidFill>
+                  <a:schemeClr val="bg1">
+                    <a:lumMod val="50000"/>
+                  </a:schemeClr>
+                </a:solidFill>
+              </a:rPr>
+              <a:t> im </a:t>
+            </a:r>
+            <a:r>
+              <a:rPr lang="de-DE" dirty="0">
+                <a:solidFill>
+                  <a:schemeClr val="bg1">
+                    <a:lumMod val="50000"/>
+                  </a:schemeClr>
+                </a:solidFill>
+                <a:latin typeface="Fira Mono OT"/>
+                <a:cs typeface="Fira Mono OT"/>
+              </a:rPr>
+              <a:t>.</a:t>
+            </a:r>
+            <a:r>
+              <a:rPr lang="de-DE" dirty="0" err="1">
+                <a:solidFill>
+                  <a:schemeClr val="bg1">
+                    <a:lumMod val="50000"/>
+                  </a:schemeClr>
+                </a:solidFill>
+                <a:latin typeface="Fira Mono OT"/>
+                <a:cs typeface="Fira Mono OT"/>
+              </a:rPr>
+              <a:t>ecore</a:t>
+            </a:r>
+            <a:r>
+              <a:rPr lang="de-DE" dirty="0">
+                <a:solidFill>
+                  <a:schemeClr val="bg1">
+                    <a:lumMod val="50000"/>
+                  </a:schemeClr>
+                </a:solidFill>
+              </a:rPr>
+              <a:t>-Modell können nicht interpretiert werden</a:t>
+            </a:r>
           </a:p>
         </p:txBody>
       </p:sp>
     </p:spTree>
     <p:extLst>
       <p:ext uri="{BB962C8B-B14F-4D97-AF65-F5344CB8AC3E}">
-        <p14:creationId xmlns:p14="http://schemas.microsoft.com/office/powerpoint/2010/main" val="3791329346"/>
+        <p14:creationId xmlns:p14="http://schemas.microsoft.com/office/powerpoint/2010/main" val="2834062446"/>
       </p:ext>
     </p:extLst>
   </p:cSld>
@@ -3714,7 +5694,7 @@
       </p:grpSpPr>
       <p:sp>
         <p:nvSpPr>
-          <p:cNvPr id="3" name="Titel 2"/>
+          <p:cNvPr id="2" name="Titel 1"/>
           <p:cNvSpPr>
             <a:spLocks noGrp="1"/>
           </p:cNvSpPr>
@@ -3729,7 +5709,380 @@
           <a:p>
             <a:r>
               <a:rPr lang="de-DE" dirty="0" smtClean="0"/>
-              <a:t>Vielen Dank für die Aufmerksamkeit!</a:t>
+              <a:t>Alternative</a:t>
+            </a:r>
+            <a:endParaRPr lang="de-DE" dirty="0"/>
+          </a:p>
+        </p:txBody>
+      </p:sp>
+      <p:sp>
+        <p:nvSpPr>
+          <p:cNvPr id="4" name="Foliennummernplatzhalter 3"/>
+          <p:cNvSpPr>
+            <a:spLocks noGrp="1"/>
+          </p:cNvSpPr>
+          <p:nvPr>
+            <p:ph type="sldNum" sz="quarter" idx="10"/>
+          </p:nvPr>
+        </p:nvSpPr>
+        <p:spPr/>
+        <p:txBody>
+          <a:bodyPr/>
+          <a:lstStyle/>
+          <a:p>
+            <a:fld id="{1215FA07-EE23-A948-A6ED-56C5FE5A7EE4}" type="slidenum">
+              <a:rPr lang="de-DE" smtClean="0"/>
+              <a:t>8</a:t>
+            </a:fld>
+            <a:endParaRPr lang="de-DE"/>
+          </a:p>
+        </p:txBody>
+      </p:sp>
+      <p:grpSp>
+        <p:nvGrpSpPr>
+          <p:cNvPr id="7" name="Gruppierung 6"/>
+          <p:cNvGrpSpPr/>
+          <p:nvPr/>
+        </p:nvGrpSpPr>
+        <p:grpSpPr>
+          <a:xfrm>
+            <a:off x="6574012" y="2034285"/>
+            <a:ext cx="1908213" cy="1174581"/>
+            <a:chOff x="6574012" y="2082800"/>
+            <a:chExt cx="1908213" cy="1174581"/>
+          </a:xfrm>
+        </p:grpSpPr>
+        <p:sp>
+          <p:nvSpPr>
+            <p:cNvPr id="5" name="Gefaltete Ecke 4"/>
+            <p:cNvSpPr/>
+            <p:nvPr/>
+          </p:nvSpPr>
+          <p:spPr>
+            <a:xfrm rot="10800000" flipH="1">
+              <a:off x="7213600" y="2082800"/>
+              <a:ext cx="660400" cy="829733"/>
+            </a:xfrm>
+            <a:prstGeom prst="foldedCorner">
+              <a:avLst>
+                <a:gd name="adj" fmla="val 29488"/>
+              </a:avLst>
+            </a:prstGeom>
+          </p:spPr>
+          <p:style>
+            <a:lnRef idx="1">
+              <a:schemeClr val="accent1"/>
+            </a:lnRef>
+            <a:fillRef idx="3">
+              <a:schemeClr val="accent1"/>
+            </a:fillRef>
+            <a:effectRef idx="2">
+              <a:schemeClr val="accent1"/>
+            </a:effectRef>
+            <a:fontRef idx="minor">
+              <a:schemeClr val="lt1"/>
+            </a:fontRef>
+          </p:style>
+          <p:txBody>
+            <a:bodyPr rtlCol="0" anchor="ctr"/>
+            <a:lstStyle/>
+            <a:p>
+              <a:pPr algn="ctr"/>
+              <a:endParaRPr lang="de-DE"/>
+            </a:p>
+          </p:txBody>
+        </p:sp>
+        <p:sp>
+          <p:nvSpPr>
+            <p:cNvPr id="6" name="Textfeld 5"/>
+            <p:cNvSpPr txBox="1"/>
+            <p:nvPr/>
+          </p:nvSpPr>
+          <p:spPr>
+            <a:xfrm>
+              <a:off x="6574012" y="2949604"/>
+              <a:ext cx="1908213" cy="307777"/>
+            </a:xfrm>
+            <a:prstGeom prst="rect">
+              <a:avLst/>
+            </a:prstGeom>
+            <a:noFill/>
+          </p:spPr>
+          <p:txBody>
+            <a:bodyPr wrap="none" rtlCol="0">
+              <a:spAutoFit/>
+            </a:bodyPr>
+            <a:lstStyle/>
+            <a:p>
+              <a:r>
+                <a:rPr lang="de-DE" sz="1400" dirty="0" err="1" smtClean="0">
+                  <a:solidFill>
+                    <a:srgbClr val="7F7F7F"/>
+                  </a:solidFill>
+                  <a:latin typeface="Fira Mono OT"/>
+                  <a:cs typeface="Fira Mono OT"/>
+                </a:rPr>
+                <a:t>Generation.xtend</a:t>
+              </a:r>
+              <a:endParaRPr lang="de-DE" sz="1400" dirty="0">
+                <a:solidFill>
+                  <a:srgbClr val="7F7F7F"/>
+                </a:solidFill>
+                <a:latin typeface="Fira Mono OT"/>
+                <a:cs typeface="Fira Mono OT"/>
+              </a:endParaRPr>
+            </a:p>
+          </p:txBody>
+        </p:sp>
+      </p:grpSp>
+      <p:grpSp>
+        <p:nvGrpSpPr>
+          <p:cNvPr id="8" name="Gruppierung 7"/>
+          <p:cNvGrpSpPr/>
+          <p:nvPr/>
+        </p:nvGrpSpPr>
+        <p:grpSpPr>
+          <a:xfrm>
+            <a:off x="6574012" y="3758509"/>
+            <a:ext cx="1800492" cy="1174581"/>
+            <a:chOff x="6574012" y="2082800"/>
+            <a:chExt cx="1800492" cy="1174581"/>
+          </a:xfrm>
+        </p:grpSpPr>
+        <p:sp>
+          <p:nvSpPr>
+            <p:cNvPr id="9" name="Gefaltete Ecke 8"/>
+            <p:cNvSpPr/>
+            <p:nvPr/>
+          </p:nvSpPr>
+          <p:spPr>
+            <a:xfrm rot="10800000" flipH="1">
+              <a:off x="7213600" y="2082800"/>
+              <a:ext cx="660400" cy="829733"/>
+            </a:xfrm>
+            <a:prstGeom prst="foldedCorner">
+              <a:avLst>
+                <a:gd name="adj" fmla="val 29488"/>
+              </a:avLst>
+            </a:prstGeom>
+          </p:spPr>
+          <p:style>
+            <a:lnRef idx="1">
+              <a:schemeClr val="accent1"/>
+            </a:lnRef>
+            <a:fillRef idx="3">
+              <a:schemeClr val="accent1"/>
+            </a:fillRef>
+            <a:effectRef idx="2">
+              <a:schemeClr val="accent1"/>
+            </a:effectRef>
+            <a:fontRef idx="minor">
+              <a:schemeClr val="lt1"/>
+            </a:fontRef>
+          </p:style>
+          <p:txBody>
+            <a:bodyPr rtlCol="0" anchor="ctr"/>
+            <a:lstStyle/>
+            <a:p>
+              <a:pPr algn="ctr"/>
+              <a:endParaRPr lang="de-DE"/>
+            </a:p>
+          </p:txBody>
+        </p:sp>
+        <p:sp>
+          <p:nvSpPr>
+            <p:cNvPr id="10" name="Textfeld 9"/>
+            <p:cNvSpPr txBox="1"/>
+            <p:nvPr/>
+          </p:nvSpPr>
+          <p:spPr>
+            <a:xfrm>
+              <a:off x="6574012" y="2949604"/>
+              <a:ext cx="1800492" cy="307777"/>
+            </a:xfrm>
+            <a:prstGeom prst="rect">
+              <a:avLst/>
+            </a:prstGeom>
+            <a:noFill/>
+          </p:spPr>
+          <p:txBody>
+            <a:bodyPr wrap="none" rtlCol="0">
+              <a:spAutoFit/>
+            </a:bodyPr>
+            <a:lstStyle/>
+            <a:p>
+              <a:r>
+                <a:rPr lang="de-DE" sz="1400" dirty="0" err="1" smtClean="0">
+                  <a:solidFill>
+                    <a:srgbClr val="7F7F7F"/>
+                  </a:solidFill>
+                  <a:latin typeface="Fira Mono OT"/>
+                  <a:cs typeface="Fira Mono OT"/>
+                </a:rPr>
+                <a:t>Generator.xtend</a:t>
+              </a:r>
+              <a:endParaRPr lang="de-DE" sz="1400" dirty="0">
+                <a:solidFill>
+                  <a:srgbClr val="7F7F7F"/>
+                </a:solidFill>
+                <a:latin typeface="Fira Mono OT"/>
+                <a:cs typeface="Fira Mono OT"/>
+              </a:endParaRPr>
+            </a:p>
+          </p:txBody>
+        </p:sp>
+      </p:grpSp>
+      <p:sp>
+        <p:nvSpPr>
+          <p:cNvPr id="11" name="Textfeld 10"/>
+          <p:cNvSpPr txBox="1"/>
+          <p:nvPr/>
+        </p:nvSpPr>
+        <p:spPr>
+          <a:xfrm>
+            <a:off x="314238" y="1856569"/>
+            <a:ext cx="6086562" cy="3440474"/>
+          </a:xfrm>
+          <a:prstGeom prst="rect">
+            <a:avLst/>
+          </a:prstGeom>
+        </p:spPr>
+        <p:txBody>
+          <a:bodyPr vert="horz" lIns="91440" tIns="45720" rIns="91440" bIns="45720" rtlCol="0">
+            <a:normAutofit/>
+          </a:bodyPr>
+          <a:lstStyle>
+            <a:lvl1pPr marL="342900" indent="-342900">
+              <a:lnSpc>
+                <a:spcPct val="120000"/>
+              </a:lnSpc>
+              <a:spcBef>
+                <a:spcPct val="20000"/>
+              </a:spcBef>
+              <a:spcAft>
+                <a:spcPts val="600"/>
+              </a:spcAft>
+              <a:buClr>
+                <a:schemeClr val="accent1"/>
+              </a:buClr>
+              <a:buFont typeface="Wingdings" charset="2"/>
+              <a:buChar char="§"/>
+              <a:defRPr sz="3200" b="0" i="0">
+                <a:latin typeface="Fira Sans"/>
+                <a:cs typeface="Fira Sans"/>
+              </a:defRPr>
+            </a:lvl1pPr>
+            <a:lvl2pPr marL="742950" indent="-285750">
+              <a:spcBef>
+                <a:spcPct val="20000"/>
+              </a:spcBef>
+              <a:buClr>
+                <a:schemeClr val="accent1"/>
+              </a:buClr>
+              <a:buFont typeface="Lucida Grande"/>
+              <a:buChar char="»"/>
+              <a:defRPr sz="2800" b="0" i="0">
+                <a:latin typeface="Fira Sans"/>
+                <a:cs typeface="Fira Sans"/>
+              </a:defRPr>
+            </a:lvl2pPr>
+            <a:lvl3pPr marL="1143000" indent="-228600">
+              <a:spcBef>
+                <a:spcPct val="20000"/>
+              </a:spcBef>
+              <a:buClr>
+                <a:schemeClr val="accent1"/>
+              </a:buClr>
+              <a:buFont typeface="Arial"/>
+              <a:buChar char="•"/>
+              <a:defRPr sz="2400" b="0" i="0">
+                <a:latin typeface="Fira Sans"/>
+                <a:cs typeface="Fira Sans"/>
+              </a:defRPr>
+            </a:lvl3pPr>
+            <a:lvl4pPr marL="1600200" indent="-228600">
+              <a:spcBef>
+                <a:spcPct val="20000"/>
+              </a:spcBef>
+              <a:buClr>
+                <a:schemeClr val="accent1"/>
+              </a:buClr>
+              <a:buFont typeface="Arial"/>
+              <a:buChar char="–"/>
+              <a:defRPr sz="2000" b="0" i="0">
+                <a:latin typeface="Fira Sans"/>
+                <a:cs typeface="Fira Sans"/>
+              </a:defRPr>
+            </a:lvl4pPr>
+            <a:lvl5pPr indent="0">
+              <a:spcBef>
+                <a:spcPct val="20000"/>
+              </a:spcBef>
+              <a:buClr>
+                <a:schemeClr val="accent1"/>
+              </a:buClr>
+              <a:buFontTx/>
+              <a:buNone/>
+              <a:defRPr sz="2000" b="0" i="0">
+                <a:latin typeface="Fira Sans"/>
+                <a:cs typeface="Fira Sans"/>
+              </a:defRPr>
+            </a:lvl5pPr>
+            <a:lvl6pPr marL="2514600" indent="-228600">
+              <a:spcBef>
+                <a:spcPct val="20000"/>
+              </a:spcBef>
+              <a:buFont typeface="Arial"/>
+              <a:buChar char="•"/>
+              <a:defRPr sz="2000"/>
+            </a:lvl6pPr>
+            <a:lvl7pPr marL="2971800" indent="-228600">
+              <a:spcBef>
+                <a:spcPct val="20000"/>
+              </a:spcBef>
+              <a:buFont typeface="Arial"/>
+              <a:buChar char="•"/>
+              <a:defRPr sz="2000"/>
+            </a:lvl7pPr>
+            <a:lvl8pPr marL="3429000" indent="-228600">
+              <a:spcBef>
+                <a:spcPct val="20000"/>
+              </a:spcBef>
+              <a:buFont typeface="Arial"/>
+              <a:buChar char="•"/>
+              <a:defRPr sz="2000"/>
+            </a:lvl8pPr>
+            <a:lvl9pPr marL="3886200" indent="-228600">
+              <a:spcBef>
+                <a:spcPct val="20000"/>
+              </a:spcBef>
+              <a:buFont typeface="Arial"/>
+              <a:buChar char="•"/>
+              <a:defRPr sz="2000"/>
+            </a:lvl9pPr>
+          </a:lstStyle>
+          <a:p>
+            <a:r>
+              <a:rPr lang="de-DE" dirty="0"/>
+              <a:t>Einlesen des Eingabemodells mit </a:t>
+            </a:r>
+            <a:r>
+              <a:rPr lang="de-DE" dirty="0" err="1" smtClean="0"/>
+              <a:t>Xtend</a:t>
+            </a:r>
+          </a:p>
+          <a:p>
+            <a:r>
+              <a:rPr lang="de-DE" dirty="0" smtClean="0"/>
+              <a:t>Ausführen des </a:t>
+            </a:r>
+            <a:r>
+              <a:rPr lang="de-DE" dirty="0" err="1" smtClean="0"/>
+              <a:t>IGenerator</a:t>
+            </a:r>
+            <a:r>
+              <a:rPr lang="de-DE" dirty="0" smtClean="0"/>
+              <a:t> mit der eigentlichen Code-Generierung</a:t>
             </a:r>
             <a:endParaRPr lang="de-DE" dirty="0"/>
           </a:p>
@@ -3738,7 +6091,7 @@
     </p:spTree>
     <p:extLst>
       <p:ext uri="{BB962C8B-B14F-4D97-AF65-F5344CB8AC3E}">
-        <p14:creationId xmlns:p14="http://schemas.microsoft.com/office/powerpoint/2010/main" val="3593891134"/>
+        <p14:creationId xmlns:p14="http://schemas.microsoft.com/office/powerpoint/2010/main" val="2150706580"/>
       </p:ext>
     </p:extLst>
   </p:cSld>
@@ -3748,9 +6101,1752 @@
   <p:timing>
     <p:tnLst>
       <p:par>
-        <p:cTn xmlns:p14="http://schemas.microsoft.com/office/powerpoint/2010/main" id="1" dur="indefinite" restart="never" nodeType="tmRoot"/>
+        <p:cTn xmlns:p14="http://schemas.microsoft.com/office/powerpoint/2010/main" id="1" dur="indefinite" restart="never" nodeType="tmRoot">
+          <p:childTnLst>
+            <p:seq concurrent="1" nextAc="seek">
+              <p:cTn id="2" dur="indefinite" nodeType="mainSeq">
+                <p:childTnLst>
+                  <p:par>
+                    <p:cTn id="3" fill="hold">
+                      <p:stCondLst>
+                        <p:cond delay="indefinite"/>
+                      </p:stCondLst>
+                      <p:childTnLst>
+                        <p:par>
+                          <p:cTn id="4" fill="hold">
+                            <p:stCondLst>
+                              <p:cond delay="0"/>
+                            </p:stCondLst>
+                            <p:childTnLst>
+                              <p:par>
+                                <p:cTn id="5" presetID="1" presetClass="entr" presetSubtype="0" fill="hold" nodeType="clickEffect">
+                                  <p:stCondLst>
+                                    <p:cond delay="0"/>
+                                  </p:stCondLst>
+                                  <p:childTnLst>
+                                    <p:set>
+                                      <p:cBhvr>
+                                        <p:cTn id="6" dur="1" fill="hold">
+                                          <p:stCondLst>
+                                            <p:cond delay="0"/>
+                                          </p:stCondLst>
+                                        </p:cTn>
+                                        <p:tgtEl>
+                                          <p:spTgt spid="11">
+                                            <p:txEl>
+                                              <p:pRg st="0" end="0"/>
+                                            </p:txEl>
+                                          </p:spTgt>
+                                        </p:tgtEl>
+                                        <p:attrNameLst>
+                                          <p:attrName>style.visibility</p:attrName>
+                                        </p:attrNameLst>
+                                      </p:cBhvr>
+                                      <p:to>
+                                        <p:strVal val="visible"/>
+                                      </p:to>
+                                    </p:set>
+                                  </p:childTnLst>
+                                </p:cTn>
+                              </p:par>
+                              <p:par>
+                                <p:cTn id="7" presetID="1" presetClass="entr" presetSubtype="0" fill="hold" nodeType="withEffect">
+                                  <p:stCondLst>
+                                    <p:cond delay="0"/>
+                                  </p:stCondLst>
+                                  <p:childTnLst>
+                                    <p:set>
+                                      <p:cBhvr>
+                                        <p:cTn id="8" dur="1" fill="hold">
+                                          <p:stCondLst>
+                                            <p:cond delay="0"/>
+                                          </p:stCondLst>
+                                        </p:cTn>
+                                        <p:tgtEl>
+                                          <p:spTgt spid="7"/>
+                                        </p:tgtEl>
+                                        <p:attrNameLst>
+                                          <p:attrName>style.visibility</p:attrName>
+                                        </p:attrNameLst>
+                                      </p:cBhvr>
+                                      <p:to>
+                                        <p:strVal val="visible"/>
+                                      </p:to>
+                                    </p:set>
+                                  </p:childTnLst>
+                                </p:cTn>
+                              </p:par>
+                            </p:childTnLst>
+                          </p:cTn>
+                        </p:par>
+                      </p:childTnLst>
+                    </p:cTn>
+                  </p:par>
+                  <p:par>
+                    <p:cTn id="9" fill="hold">
+                      <p:stCondLst>
+                        <p:cond delay="indefinite"/>
+                      </p:stCondLst>
+                      <p:childTnLst>
+                        <p:par>
+                          <p:cTn id="10" fill="hold">
+                            <p:stCondLst>
+                              <p:cond delay="0"/>
+                            </p:stCondLst>
+                            <p:childTnLst>
+                              <p:par>
+                                <p:cTn id="11" presetID="1" presetClass="entr" presetSubtype="0" fill="hold" nodeType="clickEffect">
+                                  <p:stCondLst>
+                                    <p:cond delay="0"/>
+                                  </p:stCondLst>
+                                  <p:childTnLst>
+                                    <p:set>
+                                      <p:cBhvr>
+                                        <p:cTn id="12" dur="1" fill="hold">
+                                          <p:stCondLst>
+                                            <p:cond delay="0"/>
+                                          </p:stCondLst>
+                                        </p:cTn>
+                                        <p:tgtEl>
+                                          <p:spTgt spid="11">
+                                            <p:txEl>
+                                              <p:pRg st="1" end="1"/>
+                                            </p:txEl>
+                                          </p:spTgt>
+                                        </p:tgtEl>
+                                        <p:attrNameLst>
+                                          <p:attrName>style.visibility</p:attrName>
+                                        </p:attrNameLst>
+                                      </p:cBhvr>
+                                      <p:to>
+                                        <p:strVal val="visible"/>
+                                      </p:to>
+                                    </p:set>
+                                  </p:childTnLst>
+                                </p:cTn>
+                              </p:par>
+                              <p:par>
+                                <p:cTn id="13" presetID="1" presetClass="entr" presetSubtype="0" fill="hold" nodeType="withEffect">
+                                  <p:stCondLst>
+                                    <p:cond delay="0"/>
+                                  </p:stCondLst>
+                                  <p:childTnLst>
+                                    <p:set>
+                                      <p:cBhvr>
+                                        <p:cTn id="14" dur="1" fill="hold">
+                                          <p:stCondLst>
+                                            <p:cond delay="0"/>
+                                          </p:stCondLst>
+                                        </p:cTn>
+                                        <p:tgtEl>
+                                          <p:spTgt spid="8"/>
+                                        </p:tgtEl>
+                                        <p:attrNameLst>
+                                          <p:attrName>style.visibility</p:attrName>
+                                        </p:attrNameLst>
+                                      </p:cBhvr>
+                                      <p:to>
+                                        <p:strVal val="visible"/>
+                                      </p:to>
+                                    </p:set>
+                                  </p:childTnLst>
+                                </p:cTn>
+                              </p:par>
+                            </p:childTnLst>
+                          </p:cTn>
+                        </p:par>
+                      </p:childTnLst>
+                    </p:cTn>
+                  </p:par>
+                </p:childTnLst>
+              </p:cTn>
+              <p:prevCondLst>
+                <p:cond evt="onPrev" delay="0">
+                  <p:tgtEl>
+                    <p:sldTgt/>
+                  </p:tgtEl>
+                </p:cond>
+              </p:prevCondLst>
+              <p:nextCondLst>
+                <p:cond evt="onNext" delay="0">
+                  <p:tgtEl>
+                    <p:sldTgt/>
+                  </p:tgtEl>
+                </p:cond>
+              </p:nextCondLst>
+            </p:seq>
+          </p:childTnLst>
+        </p:cTn>
       </p:par>
     </p:tnLst>
+  </p:timing>
+</p:sld>
+</file>
+
+<file path=ppt/slides/slide9.xml><?xml version="1.0" encoding="utf-8"?>
+<p:sld xmlns:a="http://schemas.openxmlformats.org/drawingml/2006/main" xmlns:r="http://schemas.openxmlformats.org/officeDocument/2006/relationships" xmlns:p="http://schemas.openxmlformats.org/presentationml/2006/main">
+  <p:cSld>
+    <p:spTree>
+      <p:nvGrpSpPr>
+        <p:cNvPr id="1" name=""/>
+        <p:cNvGrpSpPr/>
+        <p:nvPr/>
+      </p:nvGrpSpPr>
+      <p:grpSpPr>
+        <a:xfrm>
+          <a:off x="0" y="0"/>
+          <a:ext cx="0" cy="0"/>
+          <a:chOff x="0" y="0"/>
+          <a:chExt cx="0" cy="0"/>
+        </a:xfrm>
+      </p:grpSpPr>
+      <p:sp>
+        <p:nvSpPr>
+          <p:cNvPr id="2" name="Titel 1"/>
+          <p:cNvSpPr>
+            <a:spLocks noGrp="1"/>
+          </p:cNvSpPr>
+          <p:nvPr>
+            <p:ph type="title"/>
+          </p:nvPr>
+        </p:nvSpPr>
+        <p:spPr/>
+        <p:txBody>
+          <a:bodyPr/>
+          <a:lstStyle/>
+          <a:p>
+            <a:r>
+              <a:rPr lang="de-DE" dirty="0" smtClean="0"/>
+              <a:t>Ablauf</a:t>
+            </a:r>
+            <a:endParaRPr lang="de-DE" dirty="0"/>
+          </a:p>
+        </p:txBody>
+      </p:sp>
+      <p:sp>
+        <p:nvSpPr>
+          <p:cNvPr id="4" name="Foliennummernplatzhalter 3"/>
+          <p:cNvSpPr>
+            <a:spLocks noGrp="1"/>
+          </p:cNvSpPr>
+          <p:nvPr>
+            <p:ph type="sldNum" sz="quarter" idx="10"/>
+          </p:nvPr>
+        </p:nvSpPr>
+        <p:spPr/>
+        <p:txBody>
+          <a:bodyPr/>
+          <a:lstStyle/>
+          <a:p>
+            <a:fld id="{1215FA07-EE23-A948-A6ED-56C5FE5A7EE4}" type="slidenum">
+              <a:rPr lang="de-DE" smtClean="0"/>
+              <a:t>9</a:t>
+            </a:fld>
+            <a:endParaRPr lang="de-DE"/>
+          </a:p>
+        </p:txBody>
+      </p:sp>
+      <p:grpSp>
+        <p:nvGrpSpPr>
+          <p:cNvPr id="5" name="Gruppierung 4"/>
+          <p:cNvGrpSpPr/>
+          <p:nvPr/>
+        </p:nvGrpSpPr>
+        <p:grpSpPr>
+          <a:xfrm>
+            <a:off x="237069" y="1060485"/>
+            <a:ext cx="3093152" cy="864469"/>
+            <a:chOff x="6574012" y="2392912"/>
+            <a:chExt cx="3093152" cy="864469"/>
+          </a:xfrm>
+        </p:grpSpPr>
+        <p:sp>
+          <p:nvSpPr>
+            <p:cNvPr id="6" name="Gefaltete Ecke 5"/>
+            <p:cNvSpPr/>
+            <p:nvPr/>
+          </p:nvSpPr>
+          <p:spPr>
+            <a:xfrm rot="10800000" flipH="1">
+              <a:off x="7907864" y="2392912"/>
+              <a:ext cx="428976" cy="519620"/>
+            </a:xfrm>
+            <a:prstGeom prst="foldedCorner">
+              <a:avLst>
+                <a:gd name="adj" fmla="val 29488"/>
+              </a:avLst>
+            </a:prstGeom>
+          </p:spPr>
+          <p:style>
+            <a:lnRef idx="1">
+              <a:schemeClr val="accent4"/>
+            </a:lnRef>
+            <a:fillRef idx="3">
+              <a:schemeClr val="accent4"/>
+            </a:fillRef>
+            <a:effectRef idx="2">
+              <a:schemeClr val="accent4"/>
+            </a:effectRef>
+            <a:fontRef idx="minor">
+              <a:schemeClr val="lt1"/>
+            </a:fontRef>
+          </p:style>
+          <p:txBody>
+            <a:bodyPr rtlCol="0" anchor="ctr"/>
+            <a:lstStyle/>
+            <a:p>
+              <a:pPr algn="ctr"/>
+              <a:endParaRPr lang="de-DE"/>
+            </a:p>
+          </p:txBody>
+        </p:sp>
+        <p:sp>
+          <p:nvSpPr>
+            <p:cNvPr id="7" name="Textfeld 6"/>
+            <p:cNvSpPr txBox="1"/>
+            <p:nvPr/>
+          </p:nvSpPr>
+          <p:spPr>
+            <a:xfrm>
+              <a:off x="6574012" y="2949604"/>
+              <a:ext cx="3093152" cy="307777"/>
+            </a:xfrm>
+            <a:prstGeom prst="rect">
+              <a:avLst/>
+            </a:prstGeom>
+            <a:noFill/>
+          </p:spPr>
+          <p:txBody>
+            <a:bodyPr wrap="none" rtlCol="0">
+              <a:spAutoFit/>
+            </a:bodyPr>
+            <a:lstStyle/>
+            <a:p>
+              <a:r>
+                <a:rPr lang="de-DE" sz="1400" dirty="0" err="1" smtClean="0">
+                  <a:solidFill>
+                    <a:srgbClr val="7F7F7F"/>
+                  </a:solidFill>
+                  <a:latin typeface="Fira Mono OT"/>
+                  <a:cs typeface="Fira Mono OT"/>
+                </a:rPr>
+                <a:t>Modell.componentbasedsystem</a:t>
+              </a:r>
+              <a:endParaRPr lang="de-DE" sz="1400" dirty="0">
+                <a:solidFill>
+                  <a:srgbClr val="7F7F7F"/>
+                </a:solidFill>
+                <a:latin typeface="Fira Mono OT"/>
+                <a:cs typeface="Fira Mono OT"/>
+              </a:endParaRPr>
+            </a:p>
+          </p:txBody>
+        </p:sp>
+      </p:grpSp>
+      <p:sp>
+        <p:nvSpPr>
+          <p:cNvPr id="8" name="Pfeil nach unten 7"/>
+          <p:cNvSpPr/>
+          <p:nvPr/>
+        </p:nvSpPr>
+        <p:spPr>
+          <a:xfrm>
+            <a:off x="1486257" y="2087542"/>
+            <a:ext cx="660400" cy="457200"/>
+          </a:xfrm>
+          <a:prstGeom prst="downArrow">
+            <a:avLst/>
+          </a:prstGeom>
+        </p:spPr>
+        <p:style>
+          <a:lnRef idx="2">
+            <a:schemeClr val="dk1"/>
+          </a:lnRef>
+          <a:fillRef idx="1">
+            <a:schemeClr val="lt1"/>
+          </a:fillRef>
+          <a:effectRef idx="0">
+            <a:schemeClr val="dk1"/>
+          </a:effectRef>
+          <a:fontRef idx="minor">
+            <a:schemeClr val="dk1"/>
+          </a:fontRef>
+        </p:style>
+        <p:txBody>
+          <a:bodyPr rtlCol="0" anchor="ctr"/>
+          <a:lstStyle/>
+          <a:p>
+            <a:pPr algn="ctr"/>
+            <a:endParaRPr lang="de-DE"/>
+          </a:p>
+        </p:txBody>
+      </p:sp>
+      <p:grpSp>
+        <p:nvGrpSpPr>
+          <p:cNvPr id="9" name="Gruppierung 8"/>
+          <p:cNvGrpSpPr/>
+          <p:nvPr/>
+        </p:nvGrpSpPr>
+        <p:grpSpPr>
+          <a:xfrm>
+            <a:off x="863602" y="2753823"/>
+            <a:ext cx="1908213" cy="880535"/>
+            <a:chOff x="6574012" y="2376846"/>
+            <a:chExt cx="1908213" cy="880535"/>
+          </a:xfrm>
+        </p:grpSpPr>
+        <p:sp>
+          <p:nvSpPr>
+            <p:cNvPr id="10" name="Gefaltete Ecke 9"/>
+            <p:cNvSpPr/>
+            <p:nvPr/>
+          </p:nvSpPr>
+          <p:spPr>
+            <a:xfrm rot="10800000" flipH="1">
+              <a:off x="7349064" y="2376846"/>
+              <a:ext cx="395109" cy="535686"/>
+            </a:xfrm>
+            <a:prstGeom prst="foldedCorner">
+              <a:avLst>
+                <a:gd name="adj" fmla="val 29488"/>
+              </a:avLst>
+            </a:prstGeom>
+          </p:spPr>
+          <p:style>
+            <a:lnRef idx="1">
+              <a:schemeClr val="accent1"/>
+            </a:lnRef>
+            <a:fillRef idx="3">
+              <a:schemeClr val="accent1"/>
+            </a:fillRef>
+            <a:effectRef idx="2">
+              <a:schemeClr val="accent1"/>
+            </a:effectRef>
+            <a:fontRef idx="minor">
+              <a:schemeClr val="lt1"/>
+            </a:fontRef>
+          </p:style>
+          <p:txBody>
+            <a:bodyPr rtlCol="0" anchor="ctr"/>
+            <a:lstStyle/>
+            <a:p>
+              <a:pPr algn="ctr"/>
+              <a:endParaRPr lang="de-DE"/>
+            </a:p>
+          </p:txBody>
+        </p:sp>
+        <p:sp>
+          <p:nvSpPr>
+            <p:cNvPr id="11" name="Textfeld 10"/>
+            <p:cNvSpPr txBox="1"/>
+            <p:nvPr/>
+          </p:nvSpPr>
+          <p:spPr>
+            <a:xfrm>
+              <a:off x="6574012" y="2949604"/>
+              <a:ext cx="1908213" cy="307777"/>
+            </a:xfrm>
+            <a:prstGeom prst="rect">
+              <a:avLst/>
+            </a:prstGeom>
+            <a:noFill/>
+          </p:spPr>
+          <p:txBody>
+            <a:bodyPr wrap="none" rtlCol="0">
+              <a:spAutoFit/>
+            </a:bodyPr>
+            <a:lstStyle/>
+            <a:p>
+              <a:r>
+                <a:rPr lang="de-DE" sz="1400" dirty="0" err="1" smtClean="0">
+                  <a:solidFill>
+                    <a:srgbClr val="7F7F7F"/>
+                  </a:solidFill>
+                  <a:latin typeface="Fira Mono OT"/>
+                  <a:cs typeface="Fira Mono OT"/>
+                </a:rPr>
+                <a:t>Generation.xtend</a:t>
+              </a:r>
+              <a:endParaRPr lang="de-DE" sz="1400" dirty="0">
+                <a:solidFill>
+                  <a:srgbClr val="7F7F7F"/>
+                </a:solidFill>
+                <a:latin typeface="Fira Mono OT"/>
+                <a:cs typeface="Fira Mono OT"/>
+              </a:endParaRPr>
+            </a:p>
+          </p:txBody>
+        </p:sp>
+      </p:grpSp>
+      <p:sp>
+        <p:nvSpPr>
+          <p:cNvPr id="12" name="Pfeil nach unten 11"/>
+          <p:cNvSpPr/>
+          <p:nvPr/>
+        </p:nvSpPr>
+        <p:spPr>
+          <a:xfrm>
+            <a:off x="1486257" y="3786755"/>
+            <a:ext cx="660400" cy="457200"/>
+          </a:xfrm>
+          <a:prstGeom prst="downArrow">
+            <a:avLst/>
+          </a:prstGeom>
+        </p:spPr>
+        <p:style>
+          <a:lnRef idx="2">
+            <a:schemeClr val="dk1"/>
+          </a:lnRef>
+          <a:fillRef idx="1">
+            <a:schemeClr val="lt1"/>
+          </a:fillRef>
+          <a:effectRef idx="0">
+            <a:schemeClr val="dk1"/>
+          </a:effectRef>
+          <a:fontRef idx="minor">
+            <a:schemeClr val="dk1"/>
+          </a:fontRef>
+        </p:style>
+        <p:txBody>
+          <a:bodyPr rtlCol="0" anchor="ctr"/>
+          <a:lstStyle/>
+          <a:p>
+            <a:pPr algn="ctr"/>
+            <a:endParaRPr lang="de-DE"/>
+          </a:p>
+        </p:txBody>
+      </p:sp>
+      <p:grpSp>
+        <p:nvGrpSpPr>
+          <p:cNvPr id="13" name="Gruppierung 12"/>
+          <p:cNvGrpSpPr/>
+          <p:nvPr/>
+        </p:nvGrpSpPr>
+        <p:grpSpPr>
+          <a:xfrm>
+            <a:off x="931335" y="4494978"/>
+            <a:ext cx="1800492" cy="866807"/>
+            <a:chOff x="6574012" y="2390574"/>
+            <a:chExt cx="1800492" cy="866807"/>
+          </a:xfrm>
+        </p:grpSpPr>
+        <p:sp>
+          <p:nvSpPr>
+            <p:cNvPr id="14" name="Gefaltete Ecke 13"/>
+            <p:cNvSpPr/>
+            <p:nvPr/>
+          </p:nvSpPr>
+          <p:spPr>
+            <a:xfrm rot="10800000" flipH="1">
+              <a:off x="7281332" y="2390574"/>
+              <a:ext cx="395109" cy="521958"/>
+            </a:xfrm>
+            <a:prstGeom prst="foldedCorner">
+              <a:avLst>
+                <a:gd name="adj" fmla="val 29488"/>
+              </a:avLst>
+            </a:prstGeom>
+          </p:spPr>
+          <p:style>
+            <a:lnRef idx="1">
+              <a:schemeClr val="accent1"/>
+            </a:lnRef>
+            <a:fillRef idx="3">
+              <a:schemeClr val="accent1"/>
+            </a:fillRef>
+            <a:effectRef idx="2">
+              <a:schemeClr val="accent1"/>
+            </a:effectRef>
+            <a:fontRef idx="minor">
+              <a:schemeClr val="lt1"/>
+            </a:fontRef>
+          </p:style>
+          <p:txBody>
+            <a:bodyPr rtlCol="0" anchor="ctr"/>
+            <a:lstStyle/>
+            <a:p>
+              <a:pPr algn="ctr"/>
+              <a:endParaRPr lang="de-DE"/>
+            </a:p>
+          </p:txBody>
+        </p:sp>
+        <p:sp>
+          <p:nvSpPr>
+            <p:cNvPr id="15" name="Textfeld 14"/>
+            <p:cNvSpPr txBox="1"/>
+            <p:nvPr/>
+          </p:nvSpPr>
+          <p:spPr>
+            <a:xfrm>
+              <a:off x="6574012" y="2949604"/>
+              <a:ext cx="1800492" cy="307777"/>
+            </a:xfrm>
+            <a:prstGeom prst="rect">
+              <a:avLst/>
+            </a:prstGeom>
+            <a:noFill/>
+          </p:spPr>
+          <p:txBody>
+            <a:bodyPr wrap="none" rtlCol="0">
+              <a:spAutoFit/>
+            </a:bodyPr>
+            <a:lstStyle/>
+            <a:p>
+              <a:r>
+                <a:rPr lang="de-DE" sz="1400" dirty="0" err="1" smtClean="0">
+                  <a:solidFill>
+                    <a:srgbClr val="7F7F7F"/>
+                  </a:solidFill>
+                  <a:latin typeface="Fira Mono OT"/>
+                  <a:cs typeface="Fira Mono OT"/>
+                </a:rPr>
+                <a:t>Generator.xtend</a:t>
+              </a:r>
+              <a:endParaRPr lang="de-DE" sz="1400" dirty="0">
+                <a:solidFill>
+                  <a:srgbClr val="7F7F7F"/>
+                </a:solidFill>
+                <a:latin typeface="Fira Mono OT"/>
+                <a:cs typeface="Fira Mono OT"/>
+              </a:endParaRPr>
+            </a:p>
+          </p:txBody>
+        </p:sp>
+      </p:grpSp>
+      <p:sp>
+        <p:nvSpPr>
+          <p:cNvPr id="16" name="Pfeil nach unten 15"/>
+          <p:cNvSpPr/>
+          <p:nvPr/>
+        </p:nvSpPr>
+        <p:spPr>
+          <a:xfrm>
+            <a:off x="1486257" y="5522424"/>
+            <a:ext cx="660400" cy="457200"/>
+          </a:xfrm>
+          <a:prstGeom prst="downArrow">
+            <a:avLst/>
+          </a:prstGeom>
+        </p:spPr>
+        <p:style>
+          <a:lnRef idx="2">
+            <a:schemeClr val="dk1"/>
+          </a:lnRef>
+          <a:fillRef idx="1">
+            <a:schemeClr val="lt1"/>
+          </a:fillRef>
+          <a:effectRef idx="0">
+            <a:schemeClr val="dk1"/>
+          </a:effectRef>
+          <a:fontRef idx="minor">
+            <a:schemeClr val="dk1"/>
+          </a:fontRef>
+        </p:style>
+        <p:txBody>
+          <a:bodyPr rtlCol="0" anchor="ctr"/>
+          <a:lstStyle/>
+          <a:p>
+            <a:pPr algn="ctr"/>
+            <a:endParaRPr lang="de-DE"/>
+          </a:p>
+        </p:txBody>
+      </p:sp>
+      <p:grpSp>
+        <p:nvGrpSpPr>
+          <p:cNvPr id="21" name="Gruppierung 20"/>
+          <p:cNvGrpSpPr/>
+          <p:nvPr/>
+        </p:nvGrpSpPr>
+        <p:grpSpPr>
+          <a:xfrm>
+            <a:off x="558626" y="5808053"/>
+            <a:ext cx="2506559" cy="944528"/>
+            <a:chOff x="3322635" y="5723471"/>
+            <a:chExt cx="2506559" cy="944528"/>
+          </a:xfrm>
+        </p:grpSpPr>
+        <p:sp>
+          <p:nvSpPr>
+            <p:cNvPr id="19" name="Gefaltete Ecke 18"/>
+            <p:cNvSpPr/>
+            <p:nvPr/>
+          </p:nvSpPr>
+          <p:spPr>
+            <a:xfrm rot="10800000" flipH="1">
+              <a:off x="3475035" y="5723471"/>
+              <a:ext cx="449088" cy="546597"/>
+            </a:xfrm>
+            <a:prstGeom prst="foldedCorner">
+              <a:avLst>
+                <a:gd name="adj" fmla="val 29488"/>
+              </a:avLst>
+            </a:prstGeom>
+          </p:spPr>
+          <p:style>
+            <a:lnRef idx="1">
+              <a:schemeClr val="accent6"/>
+            </a:lnRef>
+            <a:fillRef idx="3">
+              <a:schemeClr val="accent6"/>
+            </a:fillRef>
+            <a:effectRef idx="2">
+              <a:schemeClr val="accent6"/>
+            </a:effectRef>
+            <a:fontRef idx="minor">
+              <a:schemeClr val="lt1"/>
+            </a:fontRef>
+          </p:style>
+          <p:txBody>
+            <a:bodyPr rtlCol="0" anchor="ctr"/>
+            <a:lstStyle/>
+            <a:p>
+              <a:pPr algn="ctr"/>
+              <a:endParaRPr lang="de-DE"/>
+            </a:p>
+          </p:txBody>
+        </p:sp>
+        <p:sp>
+          <p:nvSpPr>
+            <p:cNvPr id="18" name="Gefaltete Ecke 17"/>
+            <p:cNvSpPr/>
+            <p:nvPr/>
+          </p:nvSpPr>
+          <p:spPr>
+            <a:xfrm rot="10800000" flipH="1">
+              <a:off x="3699579" y="5977470"/>
+              <a:ext cx="449088" cy="546597"/>
+            </a:xfrm>
+            <a:prstGeom prst="foldedCorner">
+              <a:avLst>
+                <a:gd name="adj" fmla="val 29488"/>
+              </a:avLst>
+            </a:prstGeom>
+          </p:spPr>
+          <p:style>
+            <a:lnRef idx="1">
+              <a:schemeClr val="accent6"/>
+            </a:lnRef>
+            <a:fillRef idx="3">
+              <a:schemeClr val="accent6"/>
+            </a:fillRef>
+            <a:effectRef idx="2">
+              <a:schemeClr val="accent6"/>
+            </a:effectRef>
+            <a:fontRef idx="minor">
+              <a:schemeClr val="lt1"/>
+            </a:fontRef>
+          </p:style>
+          <p:txBody>
+            <a:bodyPr rtlCol="0" anchor="ctr"/>
+            <a:lstStyle/>
+            <a:p>
+              <a:pPr algn="ctr"/>
+              <a:endParaRPr lang="de-DE"/>
+            </a:p>
+          </p:txBody>
+        </p:sp>
+        <p:sp>
+          <p:nvSpPr>
+            <p:cNvPr id="17" name="Gefaltete Ecke 16"/>
+            <p:cNvSpPr/>
+            <p:nvPr/>
+          </p:nvSpPr>
+          <p:spPr>
+            <a:xfrm rot="10800000" flipH="1">
+              <a:off x="3322635" y="6121402"/>
+              <a:ext cx="449088" cy="546597"/>
+            </a:xfrm>
+            <a:prstGeom prst="foldedCorner">
+              <a:avLst>
+                <a:gd name="adj" fmla="val 29488"/>
+              </a:avLst>
+            </a:prstGeom>
+          </p:spPr>
+          <p:style>
+            <a:lnRef idx="1">
+              <a:schemeClr val="accent6"/>
+            </a:lnRef>
+            <a:fillRef idx="3">
+              <a:schemeClr val="accent6"/>
+            </a:fillRef>
+            <a:effectRef idx="2">
+              <a:schemeClr val="accent6"/>
+            </a:effectRef>
+            <a:fontRef idx="minor">
+              <a:schemeClr val="lt1"/>
+            </a:fontRef>
+          </p:style>
+          <p:txBody>
+            <a:bodyPr rtlCol="0" anchor="ctr"/>
+            <a:lstStyle/>
+            <a:p>
+              <a:pPr algn="ctr"/>
+              <a:endParaRPr lang="de-DE"/>
+            </a:p>
+          </p:txBody>
+        </p:sp>
+        <p:sp>
+          <p:nvSpPr>
+            <p:cNvPr id="20" name="Textfeld 19"/>
+            <p:cNvSpPr txBox="1"/>
+            <p:nvPr/>
+          </p:nvSpPr>
+          <p:spPr>
+            <a:xfrm>
+              <a:off x="4351867" y="6116179"/>
+              <a:ext cx="1477327" cy="307777"/>
+            </a:xfrm>
+            <a:prstGeom prst="rect">
+              <a:avLst/>
+            </a:prstGeom>
+            <a:noFill/>
+          </p:spPr>
+          <p:txBody>
+            <a:bodyPr wrap="none" rtlCol="0">
+              <a:spAutoFit/>
+            </a:bodyPr>
+            <a:lstStyle/>
+            <a:p>
+              <a:r>
+                <a:rPr lang="de-DE" sz="1400" dirty="0" smtClean="0">
+                  <a:solidFill>
+                    <a:srgbClr val="7F7F7F"/>
+                  </a:solidFill>
+                  <a:latin typeface="Fira Mono OT"/>
+                  <a:cs typeface="Fira Mono OT"/>
+                </a:rPr>
+                <a:t>Java-Klassen</a:t>
+              </a:r>
+              <a:endParaRPr lang="de-DE" sz="1400" dirty="0">
+                <a:solidFill>
+                  <a:srgbClr val="7F7F7F"/>
+                </a:solidFill>
+                <a:latin typeface="Fira Mono OT"/>
+                <a:cs typeface="Fira Mono OT"/>
+              </a:endParaRPr>
+            </a:p>
+          </p:txBody>
+        </p:sp>
+      </p:grpSp>
+      <p:sp>
+        <p:nvSpPr>
+          <p:cNvPr id="23" name="Textfeld 22"/>
+          <p:cNvSpPr txBox="1"/>
+          <p:nvPr/>
+        </p:nvSpPr>
+        <p:spPr>
+          <a:xfrm>
+            <a:off x="4392916" y="1141187"/>
+            <a:ext cx="4523366" cy="666849"/>
+          </a:xfrm>
+          <a:prstGeom prst="rect">
+            <a:avLst/>
+          </a:prstGeom>
+        </p:spPr>
+        <p:txBody>
+          <a:bodyPr vert="horz" lIns="91440" tIns="45720" rIns="91440" bIns="45720" rtlCol="0">
+            <a:normAutofit fontScale="62500" lnSpcReduction="20000"/>
+          </a:bodyPr>
+          <a:lstStyle>
+            <a:lvl1pPr marL="342900" indent="-342900">
+              <a:lnSpc>
+                <a:spcPct val="120000"/>
+              </a:lnSpc>
+              <a:spcBef>
+                <a:spcPct val="20000"/>
+              </a:spcBef>
+              <a:spcAft>
+                <a:spcPts val="600"/>
+              </a:spcAft>
+              <a:buClr>
+                <a:schemeClr val="accent1"/>
+              </a:buClr>
+              <a:buFont typeface="Wingdings" charset="2"/>
+              <a:buChar char="§"/>
+              <a:defRPr sz="3200" b="0" i="0">
+                <a:latin typeface="Fira Sans"/>
+                <a:cs typeface="Fira Sans"/>
+              </a:defRPr>
+            </a:lvl1pPr>
+            <a:lvl2pPr marL="742950" lvl="1" indent="-285750">
+              <a:lnSpc>
+                <a:spcPct val="120000"/>
+              </a:lnSpc>
+              <a:spcBef>
+                <a:spcPct val="20000"/>
+              </a:spcBef>
+              <a:spcAft>
+                <a:spcPts val="600"/>
+              </a:spcAft>
+              <a:buClr>
+                <a:schemeClr val="accent1"/>
+              </a:buClr>
+              <a:buFont typeface="Lucida Grande"/>
+              <a:buChar char="»"/>
+              <a:defRPr sz="2800" b="0" i="0">
+                <a:solidFill>
+                  <a:schemeClr val="bg1">
+                    <a:lumMod val="50000"/>
+                  </a:schemeClr>
+                </a:solidFill>
+                <a:latin typeface="Fira Sans"/>
+                <a:cs typeface="Fira Sans"/>
+              </a:defRPr>
+            </a:lvl2pPr>
+            <a:lvl3pPr marL="1143000" indent="-228600">
+              <a:spcBef>
+                <a:spcPct val="20000"/>
+              </a:spcBef>
+              <a:buClr>
+                <a:schemeClr val="accent1"/>
+              </a:buClr>
+              <a:buFont typeface="Arial"/>
+              <a:buChar char="•"/>
+              <a:defRPr sz="2400" b="0" i="0">
+                <a:latin typeface="Fira Sans"/>
+                <a:cs typeface="Fira Sans"/>
+              </a:defRPr>
+            </a:lvl3pPr>
+            <a:lvl4pPr marL="1600200" indent="-228600">
+              <a:spcBef>
+                <a:spcPct val="20000"/>
+              </a:spcBef>
+              <a:buClr>
+                <a:schemeClr val="accent1"/>
+              </a:buClr>
+              <a:buFont typeface="Arial"/>
+              <a:buChar char="–"/>
+              <a:defRPr sz="2000" b="0" i="0">
+                <a:latin typeface="Fira Sans"/>
+                <a:cs typeface="Fira Sans"/>
+              </a:defRPr>
+            </a:lvl4pPr>
+            <a:lvl5pPr indent="0">
+              <a:spcBef>
+                <a:spcPct val="20000"/>
+              </a:spcBef>
+              <a:buClr>
+                <a:schemeClr val="accent1"/>
+              </a:buClr>
+              <a:buFontTx/>
+              <a:buNone/>
+              <a:defRPr sz="2000" b="0" i="0">
+                <a:latin typeface="Fira Sans"/>
+                <a:cs typeface="Fira Sans"/>
+              </a:defRPr>
+            </a:lvl5pPr>
+            <a:lvl6pPr marL="2514600" indent="-228600">
+              <a:spcBef>
+                <a:spcPct val="20000"/>
+              </a:spcBef>
+              <a:buFont typeface="Arial"/>
+              <a:buChar char="•"/>
+              <a:defRPr sz="2000"/>
+            </a:lvl6pPr>
+            <a:lvl7pPr marL="2971800" indent="-228600">
+              <a:spcBef>
+                <a:spcPct val="20000"/>
+              </a:spcBef>
+              <a:buFont typeface="Arial"/>
+              <a:buChar char="•"/>
+              <a:defRPr sz="2000"/>
+            </a:lvl7pPr>
+            <a:lvl8pPr marL="3429000" indent="-228600">
+              <a:spcBef>
+                <a:spcPct val="20000"/>
+              </a:spcBef>
+              <a:buFont typeface="Arial"/>
+              <a:buChar char="•"/>
+              <a:defRPr sz="2000"/>
+            </a:lvl8pPr>
+            <a:lvl9pPr marL="3886200" indent="-228600">
+              <a:spcBef>
+                <a:spcPct val="20000"/>
+              </a:spcBef>
+              <a:buFont typeface="Arial"/>
+              <a:buChar char="•"/>
+              <a:defRPr sz="2000"/>
+            </a:lvl9pPr>
+          </a:lstStyle>
+          <a:p>
+            <a:r>
+              <a:rPr lang="de-DE" dirty="0"/>
+              <a:t>Modell nach unserem Metamodell</a:t>
+            </a:r>
+          </a:p>
+        </p:txBody>
+      </p:sp>
+      <p:sp>
+        <p:nvSpPr>
+          <p:cNvPr id="25" name="Textfeld 24"/>
+          <p:cNvSpPr txBox="1"/>
+          <p:nvPr/>
+        </p:nvSpPr>
+        <p:spPr>
+          <a:xfrm>
+            <a:off x="4392916" y="2570398"/>
+            <a:ext cx="4523366" cy="1387977"/>
+          </a:xfrm>
+          <a:prstGeom prst="rect">
+            <a:avLst/>
+          </a:prstGeom>
+        </p:spPr>
+        <p:txBody>
+          <a:bodyPr vert="horz" lIns="91440" tIns="45720" rIns="91440" bIns="45720" rtlCol="0">
+            <a:normAutofit fontScale="55000" lnSpcReduction="20000"/>
+          </a:bodyPr>
+          <a:lstStyle>
+            <a:lvl1pPr marL="342900" indent="-342900">
+              <a:lnSpc>
+                <a:spcPct val="120000"/>
+              </a:lnSpc>
+              <a:spcBef>
+                <a:spcPct val="20000"/>
+              </a:spcBef>
+              <a:spcAft>
+                <a:spcPts val="600"/>
+              </a:spcAft>
+              <a:buClr>
+                <a:schemeClr val="accent1"/>
+              </a:buClr>
+              <a:buFont typeface="Wingdings" charset="2"/>
+              <a:buChar char="§"/>
+              <a:defRPr sz="3200" b="0" i="0">
+                <a:latin typeface="Fira Sans"/>
+                <a:cs typeface="Fira Sans"/>
+              </a:defRPr>
+            </a:lvl1pPr>
+            <a:lvl2pPr marL="742950" lvl="1" indent="-285750">
+              <a:lnSpc>
+                <a:spcPct val="120000"/>
+              </a:lnSpc>
+              <a:spcBef>
+                <a:spcPct val="20000"/>
+              </a:spcBef>
+              <a:spcAft>
+                <a:spcPts val="600"/>
+              </a:spcAft>
+              <a:buClr>
+                <a:schemeClr val="accent1"/>
+              </a:buClr>
+              <a:buFont typeface="Lucida Grande"/>
+              <a:buChar char="»"/>
+              <a:defRPr sz="2800" b="0" i="0">
+                <a:solidFill>
+                  <a:schemeClr val="bg1">
+                    <a:lumMod val="50000"/>
+                  </a:schemeClr>
+                </a:solidFill>
+                <a:latin typeface="Fira Sans"/>
+                <a:cs typeface="Fira Sans"/>
+              </a:defRPr>
+            </a:lvl2pPr>
+            <a:lvl3pPr marL="1143000" indent="-228600">
+              <a:spcBef>
+                <a:spcPct val="20000"/>
+              </a:spcBef>
+              <a:buClr>
+                <a:schemeClr val="accent1"/>
+              </a:buClr>
+              <a:buFont typeface="Arial"/>
+              <a:buChar char="•"/>
+              <a:defRPr sz="2400" b="0" i="0">
+                <a:latin typeface="Fira Sans"/>
+                <a:cs typeface="Fira Sans"/>
+              </a:defRPr>
+            </a:lvl3pPr>
+            <a:lvl4pPr marL="1600200" indent="-228600">
+              <a:spcBef>
+                <a:spcPct val="20000"/>
+              </a:spcBef>
+              <a:buClr>
+                <a:schemeClr val="accent1"/>
+              </a:buClr>
+              <a:buFont typeface="Arial"/>
+              <a:buChar char="–"/>
+              <a:defRPr sz="2000" b="0" i="0">
+                <a:latin typeface="Fira Sans"/>
+                <a:cs typeface="Fira Sans"/>
+              </a:defRPr>
+            </a:lvl4pPr>
+            <a:lvl5pPr indent="0">
+              <a:spcBef>
+                <a:spcPct val="20000"/>
+              </a:spcBef>
+              <a:buClr>
+                <a:schemeClr val="accent1"/>
+              </a:buClr>
+              <a:buFontTx/>
+              <a:buNone/>
+              <a:defRPr sz="2000" b="0" i="0">
+                <a:latin typeface="Fira Sans"/>
+                <a:cs typeface="Fira Sans"/>
+              </a:defRPr>
+            </a:lvl5pPr>
+            <a:lvl6pPr marL="2514600" indent="-228600">
+              <a:spcBef>
+                <a:spcPct val="20000"/>
+              </a:spcBef>
+              <a:buFont typeface="Arial"/>
+              <a:buChar char="•"/>
+              <a:defRPr sz="2000"/>
+            </a:lvl6pPr>
+            <a:lvl7pPr marL="2971800" indent="-228600">
+              <a:spcBef>
+                <a:spcPct val="20000"/>
+              </a:spcBef>
+              <a:buFont typeface="Arial"/>
+              <a:buChar char="•"/>
+              <a:defRPr sz="2000"/>
+            </a:lvl7pPr>
+            <a:lvl8pPr marL="3429000" indent="-228600">
+              <a:spcBef>
+                <a:spcPct val="20000"/>
+              </a:spcBef>
+              <a:buFont typeface="Arial"/>
+              <a:buChar char="•"/>
+              <a:defRPr sz="2000"/>
+            </a:lvl8pPr>
+            <a:lvl9pPr marL="3886200" indent="-228600">
+              <a:spcBef>
+                <a:spcPct val="20000"/>
+              </a:spcBef>
+              <a:buFont typeface="Arial"/>
+              <a:buChar char="•"/>
+              <a:defRPr sz="2000"/>
+            </a:lvl9pPr>
+          </a:lstStyle>
+          <a:p>
+            <a:r>
+              <a:rPr lang="de-DE" dirty="0" err="1" smtClean="0"/>
+              <a:t>ePackages</a:t>
+            </a:r>
+            <a:r>
+              <a:rPr lang="de-DE" dirty="0" smtClean="0"/>
+              <a:t> des .</a:t>
+            </a:r>
+            <a:r>
+              <a:rPr lang="de-DE" dirty="0" err="1" smtClean="0"/>
+              <a:t>ecore</a:t>
+            </a:r>
+            <a:r>
+              <a:rPr lang="de-DE" dirty="0" smtClean="0"/>
+              <a:t>-Modells laden</a:t>
+            </a:r>
+          </a:p>
+          <a:p>
+            <a:r>
+              <a:rPr lang="de-DE" dirty="0" smtClean="0"/>
+              <a:t>Modell einlesen</a:t>
+            </a:r>
+          </a:p>
+          <a:p>
+            <a:r>
+              <a:rPr lang="de-DE" dirty="0" smtClean="0"/>
+              <a:t>Code-Generator aufrufen</a:t>
+            </a:r>
+            <a:endParaRPr lang="de-DE" dirty="0"/>
+          </a:p>
+        </p:txBody>
+      </p:sp>
+      <p:sp>
+        <p:nvSpPr>
+          <p:cNvPr id="26" name="Textfeld 25"/>
+          <p:cNvSpPr txBox="1"/>
+          <p:nvPr/>
+        </p:nvSpPr>
+        <p:spPr>
+          <a:xfrm>
+            <a:off x="4392916" y="4600232"/>
+            <a:ext cx="4523366" cy="833408"/>
+          </a:xfrm>
+          <a:prstGeom prst="rect">
+            <a:avLst/>
+          </a:prstGeom>
+        </p:spPr>
+        <p:txBody>
+          <a:bodyPr vert="horz" lIns="91440" tIns="45720" rIns="91440" bIns="45720" rtlCol="0">
+            <a:normAutofit fontScale="55000" lnSpcReduction="20000"/>
+          </a:bodyPr>
+          <a:lstStyle>
+            <a:lvl1pPr marL="342900" indent="-342900">
+              <a:lnSpc>
+                <a:spcPct val="120000"/>
+              </a:lnSpc>
+              <a:spcBef>
+                <a:spcPct val="20000"/>
+              </a:spcBef>
+              <a:spcAft>
+                <a:spcPts val="600"/>
+              </a:spcAft>
+              <a:buClr>
+                <a:schemeClr val="accent1"/>
+              </a:buClr>
+              <a:buFont typeface="Wingdings" charset="2"/>
+              <a:buChar char="§"/>
+              <a:defRPr sz="3200" b="0" i="0">
+                <a:latin typeface="Fira Sans"/>
+                <a:cs typeface="Fira Sans"/>
+              </a:defRPr>
+            </a:lvl1pPr>
+            <a:lvl2pPr marL="742950" lvl="1" indent="-285750">
+              <a:lnSpc>
+                <a:spcPct val="120000"/>
+              </a:lnSpc>
+              <a:spcBef>
+                <a:spcPct val="20000"/>
+              </a:spcBef>
+              <a:spcAft>
+                <a:spcPts val="600"/>
+              </a:spcAft>
+              <a:buClr>
+                <a:schemeClr val="accent1"/>
+              </a:buClr>
+              <a:buFont typeface="Lucida Grande"/>
+              <a:buChar char="»"/>
+              <a:defRPr sz="2800" b="0" i="0">
+                <a:solidFill>
+                  <a:schemeClr val="bg1">
+                    <a:lumMod val="50000"/>
+                  </a:schemeClr>
+                </a:solidFill>
+                <a:latin typeface="Fira Sans"/>
+                <a:cs typeface="Fira Sans"/>
+              </a:defRPr>
+            </a:lvl2pPr>
+            <a:lvl3pPr marL="1143000" indent="-228600">
+              <a:spcBef>
+                <a:spcPct val="20000"/>
+              </a:spcBef>
+              <a:buClr>
+                <a:schemeClr val="accent1"/>
+              </a:buClr>
+              <a:buFont typeface="Arial"/>
+              <a:buChar char="•"/>
+              <a:defRPr sz="2400" b="0" i="0">
+                <a:latin typeface="Fira Sans"/>
+                <a:cs typeface="Fira Sans"/>
+              </a:defRPr>
+            </a:lvl3pPr>
+            <a:lvl4pPr marL="1600200" indent="-228600">
+              <a:spcBef>
+                <a:spcPct val="20000"/>
+              </a:spcBef>
+              <a:buClr>
+                <a:schemeClr val="accent1"/>
+              </a:buClr>
+              <a:buFont typeface="Arial"/>
+              <a:buChar char="–"/>
+              <a:defRPr sz="2000" b="0" i="0">
+                <a:latin typeface="Fira Sans"/>
+                <a:cs typeface="Fira Sans"/>
+              </a:defRPr>
+            </a:lvl4pPr>
+            <a:lvl5pPr indent="0">
+              <a:spcBef>
+                <a:spcPct val="20000"/>
+              </a:spcBef>
+              <a:buClr>
+                <a:schemeClr val="accent1"/>
+              </a:buClr>
+              <a:buFontTx/>
+              <a:buNone/>
+              <a:defRPr sz="2000" b="0" i="0">
+                <a:latin typeface="Fira Sans"/>
+                <a:cs typeface="Fira Sans"/>
+              </a:defRPr>
+            </a:lvl5pPr>
+            <a:lvl6pPr marL="2514600" indent="-228600">
+              <a:spcBef>
+                <a:spcPct val="20000"/>
+              </a:spcBef>
+              <a:buFont typeface="Arial"/>
+              <a:buChar char="•"/>
+              <a:defRPr sz="2000"/>
+            </a:lvl6pPr>
+            <a:lvl7pPr marL="2971800" indent="-228600">
+              <a:spcBef>
+                <a:spcPct val="20000"/>
+              </a:spcBef>
+              <a:buFont typeface="Arial"/>
+              <a:buChar char="•"/>
+              <a:defRPr sz="2000"/>
+            </a:lvl7pPr>
+            <a:lvl8pPr marL="3429000" indent="-228600">
+              <a:spcBef>
+                <a:spcPct val="20000"/>
+              </a:spcBef>
+              <a:buFont typeface="Arial"/>
+              <a:buChar char="•"/>
+              <a:defRPr sz="2000"/>
+            </a:lvl8pPr>
+            <a:lvl9pPr marL="3886200" indent="-228600">
+              <a:spcBef>
+                <a:spcPct val="20000"/>
+              </a:spcBef>
+              <a:buFont typeface="Arial"/>
+              <a:buChar char="•"/>
+              <a:defRPr sz="2000"/>
+            </a:lvl9pPr>
+          </a:lstStyle>
+          <a:p>
+            <a:r>
+              <a:rPr lang="de-DE" dirty="0" smtClean="0"/>
+              <a:t>Code Templates</a:t>
+            </a:r>
+          </a:p>
+          <a:p>
+            <a:r>
+              <a:rPr lang="de-DE" dirty="0" smtClean="0"/>
+              <a:t>Export in Java-Dateien</a:t>
+            </a:r>
+            <a:endParaRPr lang="de-DE" dirty="0"/>
+          </a:p>
+        </p:txBody>
+      </p:sp>
+    </p:spTree>
+    <p:extLst>
+      <p:ext uri="{BB962C8B-B14F-4D97-AF65-F5344CB8AC3E}">
+        <p14:creationId xmlns:p14="http://schemas.microsoft.com/office/powerpoint/2010/main" val="2077834166"/>
+      </p:ext>
+    </p:extLst>
+  </p:cSld>
+  <p:clrMapOvr>
+    <a:masterClrMapping/>
+  </p:clrMapOvr>
+  <p:timing>
+    <p:tnLst>
+      <p:par>
+        <p:cTn xmlns:p14="http://schemas.microsoft.com/office/powerpoint/2010/main" id="1" dur="indefinite" restart="never" nodeType="tmRoot">
+          <p:childTnLst>
+            <p:seq concurrent="1" nextAc="seek">
+              <p:cTn id="2" dur="indefinite" nodeType="mainSeq">
+                <p:childTnLst>
+                  <p:par>
+                    <p:cTn id="3" fill="hold">
+                      <p:stCondLst>
+                        <p:cond delay="indefinite"/>
+                      </p:stCondLst>
+                      <p:childTnLst>
+                        <p:par>
+                          <p:cTn id="4" fill="hold">
+                            <p:stCondLst>
+                              <p:cond delay="0"/>
+                            </p:stCondLst>
+                            <p:childTnLst>
+                              <p:par>
+                                <p:cTn id="5" presetID="1" presetClass="entr" presetSubtype="0" fill="hold" nodeType="clickEffect">
+                                  <p:stCondLst>
+                                    <p:cond delay="0"/>
+                                  </p:stCondLst>
+                                  <p:childTnLst>
+                                    <p:set>
+                                      <p:cBhvr>
+                                        <p:cTn id="6" dur="1" fill="hold">
+                                          <p:stCondLst>
+                                            <p:cond delay="0"/>
+                                          </p:stCondLst>
+                                        </p:cTn>
+                                        <p:tgtEl>
+                                          <p:spTgt spid="5"/>
+                                        </p:tgtEl>
+                                        <p:attrNameLst>
+                                          <p:attrName>style.visibility</p:attrName>
+                                        </p:attrNameLst>
+                                      </p:cBhvr>
+                                      <p:to>
+                                        <p:strVal val="visible"/>
+                                      </p:to>
+                                    </p:set>
+                                  </p:childTnLst>
+                                </p:cTn>
+                              </p:par>
+                            </p:childTnLst>
+                          </p:cTn>
+                        </p:par>
+                      </p:childTnLst>
+                    </p:cTn>
+                  </p:par>
+                  <p:par>
+                    <p:cTn id="7" fill="hold">
+                      <p:stCondLst>
+                        <p:cond delay="indefinite"/>
+                      </p:stCondLst>
+                      <p:childTnLst>
+                        <p:par>
+                          <p:cTn id="8" fill="hold">
+                            <p:stCondLst>
+                              <p:cond delay="0"/>
+                            </p:stCondLst>
+                            <p:childTnLst>
+                              <p:par>
+                                <p:cTn id="9" presetID="1" presetClass="entr" presetSubtype="0" fill="hold" grpId="0" nodeType="clickEffect">
+                                  <p:stCondLst>
+                                    <p:cond delay="0"/>
+                                  </p:stCondLst>
+                                  <p:childTnLst>
+                                    <p:set>
+                                      <p:cBhvr>
+                                        <p:cTn id="10" dur="1" fill="hold">
+                                          <p:stCondLst>
+                                            <p:cond delay="0"/>
+                                          </p:stCondLst>
+                                        </p:cTn>
+                                        <p:tgtEl>
+                                          <p:spTgt spid="23"/>
+                                        </p:tgtEl>
+                                        <p:attrNameLst>
+                                          <p:attrName>style.visibility</p:attrName>
+                                        </p:attrNameLst>
+                                      </p:cBhvr>
+                                      <p:to>
+                                        <p:strVal val="visible"/>
+                                      </p:to>
+                                    </p:set>
+                                  </p:childTnLst>
+                                </p:cTn>
+                              </p:par>
+                            </p:childTnLst>
+                          </p:cTn>
+                        </p:par>
+                      </p:childTnLst>
+                    </p:cTn>
+                  </p:par>
+                  <p:par>
+                    <p:cTn id="11" fill="hold">
+                      <p:stCondLst>
+                        <p:cond delay="indefinite"/>
+                      </p:stCondLst>
+                      <p:childTnLst>
+                        <p:par>
+                          <p:cTn id="12" fill="hold">
+                            <p:stCondLst>
+                              <p:cond delay="0"/>
+                            </p:stCondLst>
+                            <p:childTnLst>
+                              <p:par>
+                                <p:cTn id="13" presetID="1" presetClass="entr" presetSubtype="0" fill="hold" grpId="0" nodeType="clickEffect">
+                                  <p:stCondLst>
+                                    <p:cond delay="0"/>
+                                  </p:stCondLst>
+                                  <p:childTnLst>
+                                    <p:set>
+                                      <p:cBhvr>
+                                        <p:cTn id="14" dur="1" fill="hold">
+                                          <p:stCondLst>
+                                            <p:cond delay="0"/>
+                                          </p:stCondLst>
+                                        </p:cTn>
+                                        <p:tgtEl>
+                                          <p:spTgt spid="8"/>
+                                        </p:tgtEl>
+                                        <p:attrNameLst>
+                                          <p:attrName>style.visibility</p:attrName>
+                                        </p:attrNameLst>
+                                      </p:cBhvr>
+                                      <p:to>
+                                        <p:strVal val="visible"/>
+                                      </p:to>
+                                    </p:set>
+                                  </p:childTnLst>
+                                </p:cTn>
+                              </p:par>
+                              <p:par>
+                                <p:cTn id="15" presetID="1" presetClass="entr" presetSubtype="0" fill="hold" nodeType="withEffect">
+                                  <p:stCondLst>
+                                    <p:cond delay="0"/>
+                                  </p:stCondLst>
+                                  <p:childTnLst>
+                                    <p:set>
+                                      <p:cBhvr>
+                                        <p:cTn id="16" dur="1" fill="hold">
+                                          <p:stCondLst>
+                                            <p:cond delay="0"/>
+                                          </p:stCondLst>
+                                        </p:cTn>
+                                        <p:tgtEl>
+                                          <p:spTgt spid="9"/>
+                                        </p:tgtEl>
+                                        <p:attrNameLst>
+                                          <p:attrName>style.visibility</p:attrName>
+                                        </p:attrNameLst>
+                                      </p:cBhvr>
+                                      <p:to>
+                                        <p:strVal val="visible"/>
+                                      </p:to>
+                                    </p:set>
+                                  </p:childTnLst>
+                                </p:cTn>
+                              </p:par>
+                            </p:childTnLst>
+                          </p:cTn>
+                        </p:par>
+                      </p:childTnLst>
+                    </p:cTn>
+                  </p:par>
+                  <p:par>
+                    <p:cTn id="17" fill="hold">
+                      <p:stCondLst>
+                        <p:cond delay="indefinite"/>
+                      </p:stCondLst>
+                      <p:childTnLst>
+                        <p:par>
+                          <p:cTn id="18" fill="hold">
+                            <p:stCondLst>
+                              <p:cond delay="0"/>
+                            </p:stCondLst>
+                            <p:childTnLst>
+                              <p:par>
+                                <p:cTn id="19" presetID="1" presetClass="entr" presetSubtype="0" fill="hold" grpId="0" nodeType="clickEffect">
+                                  <p:stCondLst>
+                                    <p:cond delay="0"/>
+                                  </p:stCondLst>
+                                  <p:childTnLst>
+                                    <p:set>
+                                      <p:cBhvr>
+                                        <p:cTn id="20" dur="1" fill="hold">
+                                          <p:stCondLst>
+                                            <p:cond delay="0"/>
+                                          </p:stCondLst>
+                                        </p:cTn>
+                                        <p:tgtEl>
+                                          <p:spTgt spid="25"/>
+                                        </p:tgtEl>
+                                        <p:attrNameLst>
+                                          <p:attrName>style.visibility</p:attrName>
+                                        </p:attrNameLst>
+                                      </p:cBhvr>
+                                      <p:to>
+                                        <p:strVal val="visible"/>
+                                      </p:to>
+                                    </p:set>
+                                  </p:childTnLst>
+                                </p:cTn>
+                              </p:par>
+                            </p:childTnLst>
+                          </p:cTn>
+                        </p:par>
+                      </p:childTnLst>
+                    </p:cTn>
+                  </p:par>
+                  <p:par>
+                    <p:cTn id="21" fill="hold">
+                      <p:stCondLst>
+                        <p:cond delay="indefinite"/>
+                      </p:stCondLst>
+                      <p:childTnLst>
+                        <p:par>
+                          <p:cTn id="22" fill="hold">
+                            <p:stCondLst>
+                              <p:cond delay="0"/>
+                            </p:stCondLst>
+                            <p:childTnLst>
+                              <p:par>
+                                <p:cTn id="23" presetID="1" presetClass="entr" presetSubtype="0" fill="hold" grpId="0" nodeType="clickEffect">
+                                  <p:stCondLst>
+                                    <p:cond delay="0"/>
+                                  </p:stCondLst>
+                                  <p:childTnLst>
+                                    <p:set>
+                                      <p:cBhvr>
+                                        <p:cTn id="24" dur="1" fill="hold">
+                                          <p:stCondLst>
+                                            <p:cond delay="0"/>
+                                          </p:stCondLst>
+                                        </p:cTn>
+                                        <p:tgtEl>
+                                          <p:spTgt spid="12"/>
+                                        </p:tgtEl>
+                                        <p:attrNameLst>
+                                          <p:attrName>style.visibility</p:attrName>
+                                        </p:attrNameLst>
+                                      </p:cBhvr>
+                                      <p:to>
+                                        <p:strVal val="visible"/>
+                                      </p:to>
+                                    </p:set>
+                                  </p:childTnLst>
+                                </p:cTn>
+                              </p:par>
+                              <p:par>
+                                <p:cTn id="25" presetID="1" presetClass="entr" presetSubtype="0" fill="hold" nodeType="withEffect">
+                                  <p:stCondLst>
+                                    <p:cond delay="0"/>
+                                  </p:stCondLst>
+                                  <p:childTnLst>
+                                    <p:set>
+                                      <p:cBhvr>
+                                        <p:cTn id="26" dur="1" fill="hold">
+                                          <p:stCondLst>
+                                            <p:cond delay="0"/>
+                                          </p:stCondLst>
+                                        </p:cTn>
+                                        <p:tgtEl>
+                                          <p:spTgt spid="13"/>
+                                        </p:tgtEl>
+                                        <p:attrNameLst>
+                                          <p:attrName>style.visibility</p:attrName>
+                                        </p:attrNameLst>
+                                      </p:cBhvr>
+                                      <p:to>
+                                        <p:strVal val="visible"/>
+                                      </p:to>
+                                    </p:set>
+                                  </p:childTnLst>
+                                </p:cTn>
+                              </p:par>
+                            </p:childTnLst>
+                          </p:cTn>
+                        </p:par>
+                      </p:childTnLst>
+                    </p:cTn>
+                  </p:par>
+                  <p:par>
+                    <p:cTn id="27" fill="hold">
+                      <p:stCondLst>
+                        <p:cond delay="indefinite"/>
+                      </p:stCondLst>
+                      <p:childTnLst>
+                        <p:par>
+                          <p:cTn id="28" fill="hold">
+                            <p:stCondLst>
+                              <p:cond delay="0"/>
+                            </p:stCondLst>
+                            <p:childTnLst>
+                              <p:par>
+                                <p:cTn id="29" presetID="1" presetClass="entr" presetSubtype="0" fill="hold" grpId="0" nodeType="clickEffect">
+                                  <p:stCondLst>
+                                    <p:cond delay="0"/>
+                                  </p:stCondLst>
+                                  <p:childTnLst>
+                                    <p:set>
+                                      <p:cBhvr>
+                                        <p:cTn id="30" dur="1" fill="hold">
+                                          <p:stCondLst>
+                                            <p:cond delay="0"/>
+                                          </p:stCondLst>
+                                        </p:cTn>
+                                        <p:tgtEl>
+                                          <p:spTgt spid="26"/>
+                                        </p:tgtEl>
+                                        <p:attrNameLst>
+                                          <p:attrName>style.visibility</p:attrName>
+                                        </p:attrNameLst>
+                                      </p:cBhvr>
+                                      <p:to>
+                                        <p:strVal val="visible"/>
+                                      </p:to>
+                                    </p:set>
+                                  </p:childTnLst>
+                                </p:cTn>
+                              </p:par>
+                            </p:childTnLst>
+                          </p:cTn>
+                        </p:par>
+                      </p:childTnLst>
+                    </p:cTn>
+                  </p:par>
+                  <p:par>
+                    <p:cTn id="31" fill="hold">
+                      <p:stCondLst>
+                        <p:cond delay="indefinite"/>
+                      </p:stCondLst>
+                      <p:childTnLst>
+                        <p:par>
+                          <p:cTn id="32" fill="hold">
+                            <p:stCondLst>
+                              <p:cond delay="0"/>
+                            </p:stCondLst>
+                            <p:childTnLst>
+                              <p:par>
+                                <p:cTn id="33" presetID="1" presetClass="entr" presetSubtype="0" fill="hold" grpId="0" nodeType="clickEffect">
+                                  <p:stCondLst>
+                                    <p:cond delay="0"/>
+                                  </p:stCondLst>
+                                  <p:childTnLst>
+                                    <p:set>
+                                      <p:cBhvr>
+                                        <p:cTn id="34" dur="1" fill="hold">
+                                          <p:stCondLst>
+                                            <p:cond delay="0"/>
+                                          </p:stCondLst>
+                                        </p:cTn>
+                                        <p:tgtEl>
+                                          <p:spTgt spid="16"/>
+                                        </p:tgtEl>
+                                        <p:attrNameLst>
+                                          <p:attrName>style.visibility</p:attrName>
+                                        </p:attrNameLst>
+                                      </p:cBhvr>
+                                      <p:to>
+                                        <p:strVal val="visible"/>
+                                      </p:to>
+                                    </p:set>
+                                  </p:childTnLst>
+                                </p:cTn>
+                              </p:par>
+                              <p:par>
+                                <p:cTn id="35" presetID="1" presetClass="entr" presetSubtype="0" fill="hold" nodeType="withEffect">
+                                  <p:stCondLst>
+                                    <p:cond delay="0"/>
+                                  </p:stCondLst>
+                                  <p:childTnLst>
+                                    <p:set>
+                                      <p:cBhvr>
+                                        <p:cTn id="36" dur="1" fill="hold">
+                                          <p:stCondLst>
+                                            <p:cond delay="0"/>
+                                          </p:stCondLst>
+                                        </p:cTn>
+                                        <p:tgtEl>
+                                          <p:spTgt spid="21"/>
+                                        </p:tgtEl>
+                                        <p:attrNameLst>
+                                          <p:attrName>style.visibility</p:attrName>
+                                        </p:attrNameLst>
+                                      </p:cBhvr>
+                                      <p:to>
+                                        <p:strVal val="visible"/>
+                                      </p:to>
+                                    </p:set>
+                                  </p:childTnLst>
+                                </p:cTn>
+                              </p:par>
+                            </p:childTnLst>
+                          </p:cTn>
+                        </p:par>
+                      </p:childTnLst>
+                    </p:cTn>
+                  </p:par>
+                </p:childTnLst>
+              </p:cTn>
+              <p:prevCondLst>
+                <p:cond evt="onPrev" delay="0">
+                  <p:tgtEl>
+                    <p:sldTgt/>
+                  </p:tgtEl>
+                </p:cond>
+              </p:prevCondLst>
+              <p:nextCondLst>
+                <p:cond evt="onNext" delay="0">
+                  <p:tgtEl>
+                    <p:sldTgt/>
+                  </p:tgtEl>
+                </p:cond>
+              </p:nextCondLst>
+            </p:seq>
+          </p:childTnLst>
+        </p:cTn>
+      </p:par>
+    </p:tnLst>
+    <p:bldLst>
+      <p:bldP spid="8" grpId="0" animBg="1"/>
+      <p:bldP spid="12" grpId="0" animBg="1"/>
+      <p:bldP spid="16" grpId="0" animBg="1"/>
+      <p:bldP spid="23" grpId="0"/>
+      <p:bldP spid="25" grpId="0"/>
+      <p:bldP spid="26" grpId="0"/>
+    </p:bldLst>
   </p:timing>
 </p:sld>
 </file>

</xml_diff>

<commit_message>
Add slide for interface inheritance.
</commit_message>
<xml_diff>
--- a/presentation/MDSD-Abschlusspraesentation.pptx
+++ b/presentation/MDSD-Abschlusspraesentation.pptx
@@ -5,10 +5,10 @@
     <p:sldMasterId id="2147483648" r:id="rId1"/>
   </p:sldMasterIdLst>
   <p:notesMasterIdLst>
-    <p:notesMasterId r:id="rId18"/>
+    <p:notesMasterId r:id="rId19"/>
   </p:notesMasterIdLst>
   <p:handoutMasterIdLst>
-    <p:handoutMasterId r:id="rId19"/>
+    <p:handoutMasterId r:id="rId20"/>
   </p:handoutMasterIdLst>
   <p:sldIdLst>
     <p:sldId id="256" r:id="rId2"/>
@@ -25,8 +25,9 @@
     <p:sldId id="305" r:id="rId13"/>
     <p:sldId id="306" r:id="rId14"/>
     <p:sldId id="307" r:id="rId15"/>
-    <p:sldId id="308" r:id="rId16"/>
-    <p:sldId id="304" r:id="rId17"/>
+    <p:sldId id="313" r:id="rId16"/>
+    <p:sldId id="308" r:id="rId17"/>
+    <p:sldId id="304" r:id="rId18"/>
   </p:sldIdLst>
   <p:sldSz cx="9144000" cy="6858000" type="screen4x3"/>
   <p:notesSz cx="6858000" cy="9144000"/>
@@ -144,6 +145,7 @@
             <p14:sldId id="305"/>
             <p14:sldId id="306"/>
             <p14:sldId id="307"/>
+            <p14:sldId id="313"/>
             <p14:sldId id="308"/>
             <p14:sldId id="304"/>
           </p14:sldIdLst>
@@ -236,7 +238,7 @@
           <a:p>
             <a:fld id="{36729675-C644-6E46-8A9C-6A4F26267E24}" type="datetimeFigureOut">
               <a:rPr lang="de-DE" smtClean="0"/>
-              <a:t>18.07.16</a:t>
+              <a:t>20.07.16</a:t>
             </a:fld>
             <a:endParaRPr lang="de-DE"/>
           </a:p>
@@ -402,7 +404,7 @@
           <a:p>
             <a:fld id="{0EA486D8-2136-344F-A443-C62CACD96E34}" type="datetimeFigureOut">
               <a:rPr lang="de-DE" smtClean="0"/>
-              <a:t>18.07.16</a:t>
+              <a:t>20.07.16</a:t>
             </a:fld>
             <a:endParaRPr lang="de-DE"/>
           </a:p>
@@ -874,7 +876,7 @@
                 <a:latin typeface="Fira Sans SemiBold Italic"/>
                 <a:cs typeface="Fira Sans SemiBold Italic"/>
               </a:rPr>
-              <a:t>Montag, 18. Juli 16</a:t>
+              <a:t>Mittwoch, 20. Juli 16</a:t>
             </a:fld>
             <a:endParaRPr lang="de-DE" b="0" i="0" dirty="0">
               <a:solidFill>
@@ -4791,6 +4793,201 @@
           <a:p>
             <a:r>
               <a:rPr lang="de-DE" dirty="0" smtClean="0"/>
+              <a:t>Vererbung für Interfaces</a:t>
+            </a:r>
+            <a:endParaRPr lang="de-DE" dirty="0"/>
+          </a:p>
+        </p:txBody>
+      </p:sp>
+      <p:sp>
+        <p:nvSpPr>
+          <p:cNvPr id="3" name="Inhaltsplatzhalter 2"/>
+          <p:cNvSpPr>
+            <a:spLocks noGrp="1"/>
+          </p:cNvSpPr>
+          <p:nvPr>
+            <p:ph idx="1"/>
+          </p:nvPr>
+        </p:nvSpPr>
+        <p:spPr/>
+        <p:txBody>
+          <a:bodyPr vert="horz" lIns="91440" tIns="45720" rIns="91440" bIns="45720" rtlCol="0">
+            <a:normAutofit/>
+          </a:bodyPr>
+          <a:lstStyle/>
+          <a:p>
+            <a:pPr>
+              <a:lnSpc>
+                <a:spcPct val="120000"/>
+              </a:lnSpc>
+              <a:spcAft>
+                <a:spcPts val="600"/>
+              </a:spcAft>
+            </a:pPr>
+            <a:r>
+              <a:rPr lang="de-DE" dirty="0"/>
+              <a:t>Anpassung im editor-</a:t>
+            </a:r>
+            <a:r>
+              <a:rPr lang="de-DE" dirty="0" err="1"/>
+              <a:t>Branch</a:t>
+            </a:r>
+            <a:endParaRPr lang="de-DE" dirty="0"/>
+          </a:p>
+          <a:p>
+            <a:pPr lvl="1">
+              <a:lnSpc>
+                <a:spcPct val="120000"/>
+              </a:lnSpc>
+              <a:spcAft>
+                <a:spcPts val="600"/>
+              </a:spcAft>
+            </a:pPr>
+            <a:r>
+              <a:rPr lang="de-DE" dirty="0">
+                <a:solidFill>
+                  <a:schemeClr val="bg1">
+                    <a:lumMod val="50000"/>
+                  </a:schemeClr>
+                </a:solidFill>
+              </a:rPr>
+              <a:t>Selbstreferenzierung von Interfaces</a:t>
+            </a:r>
+          </a:p>
+          <a:p>
+            <a:pPr>
+              <a:lnSpc>
+                <a:spcPct val="120000"/>
+              </a:lnSpc>
+              <a:spcAft>
+                <a:spcPts val="600"/>
+              </a:spcAft>
+            </a:pPr>
+            <a:r>
+              <a:rPr lang="de-DE" dirty="0"/>
+              <a:t>OCL-</a:t>
+            </a:r>
+            <a:r>
+              <a:rPr lang="de-DE" dirty="0" err="1"/>
+              <a:t>Constraint</a:t>
+            </a:r>
+            <a:r>
+              <a:rPr lang="de-DE" dirty="0"/>
+              <a:t> für zyklische Abhängigkeiten</a:t>
+            </a:r>
+          </a:p>
+          <a:p>
+            <a:pPr lvl="1">
+              <a:lnSpc>
+                <a:spcPct val="120000"/>
+              </a:lnSpc>
+              <a:spcAft>
+                <a:spcPts val="600"/>
+              </a:spcAft>
+            </a:pPr>
+            <a:r>
+              <a:rPr lang="de-DE" dirty="0">
+                <a:solidFill>
+                  <a:schemeClr val="bg1">
+                    <a:lumMod val="50000"/>
+                  </a:schemeClr>
+                </a:solidFill>
+              </a:rPr>
+              <a:t>direkte Selbstreferenz</a:t>
+            </a:r>
+          </a:p>
+          <a:p>
+            <a:pPr lvl="1">
+              <a:lnSpc>
+                <a:spcPct val="120000"/>
+              </a:lnSpc>
+              <a:spcAft>
+                <a:spcPts val="600"/>
+              </a:spcAft>
+            </a:pPr>
+            <a:r>
+              <a:rPr lang="de-DE" dirty="0">
+                <a:solidFill>
+                  <a:schemeClr val="bg1">
+                    <a:lumMod val="50000"/>
+                  </a:schemeClr>
+                </a:solidFill>
+              </a:rPr>
+              <a:t>rekursives Prüfen auf Schleifen</a:t>
+            </a:r>
+          </a:p>
+        </p:txBody>
+      </p:sp>
+      <p:sp>
+        <p:nvSpPr>
+          <p:cNvPr id="4" name="Foliennummernplatzhalter 3"/>
+          <p:cNvSpPr>
+            <a:spLocks noGrp="1"/>
+          </p:cNvSpPr>
+          <p:nvPr>
+            <p:ph type="sldNum" sz="quarter" idx="10"/>
+          </p:nvPr>
+        </p:nvSpPr>
+        <p:spPr/>
+        <p:txBody>
+          <a:bodyPr/>
+          <a:lstStyle/>
+          <a:p>
+            <a:fld id="{1215FA07-EE23-A948-A6ED-56C5FE5A7EE4}" type="slidenum">
+              <a:rPr lang="de-DE" smtClean="0"/>
+              <a:t>15</a:t>
+            </a:fld>
+            <a:endParaRPr lang="de-DE"/>
+          </a:p>
+        </p:txBody>
+      </p:sp>
+    </p:spTree>
+    <p:extLst>
+      <p:ext uri="{BB962C8B-B14F-4D97-AF65-F5344CB8AC3E}">
+        <p14:creationId xmlns:p14="http://schemas.microsoft.com/office/powerpoint/2010/main" val="1161926502"/>
+      </p:ext>
+    </p:extLst>
+  </p:cSld>
+  <p:clrMapOvr>
+    <a:masterClrMapping/>
+  </p:clrMapOvr>
+</p:sld>
+</file>
+
+<file path=ppt/slides/slide16.xml><?xml version="1.0" encoding="utf-8"?>
+<p:sld xmlns:a="http://schemas.openxmlformats.org/drawingml/2006/main" xmlns:r="http://schemas.openxmlformats.org/officeDocument/2006/relationships" xmlns:p="http://schemas.openxmlformats.org/presentationml/2006/main">
+  <p:cSld>
+    <p:spTree>
+      <p:nvGrpSpPr>
+        <p:cNvPr id="1" name=""/>
+        <p:cNvGrpSpPr/>
+        <p:nvPr/>
+      </p:nvGrpSpPr>
+      <p:grpSpPr>
+        <a:xfrm>
+          <a:off x="0" y="0"/>
+          <a:ext cx="0" cy="0"/>
+          <a:chOff x="0" y="0"/>
+          <a:chExt cx="0" cy="0"/>
+        </a:xfrm>
+      </p:grpSpPr>
+      <p:sp>
+        <p:nvSpPr>
+          <p:cNvPr id="2" name="Titel 1"/>
+          <p:cNvSpPr>
+            <a:spLocks noGrp="1"/>
+          </p:cNvSpPr>
+          <p:nvPr>
+            <p:ph type="title"/>
+          </p:nvPr>
+        </p:nvSpPr>
+        <p:spPr/>
+        <p:txBody>
+          <a:bodyPr/>
+          <a:lstStyle/>
+          <a:p>
+            <a:r>
+              <a:rPr lang="de-DE" dirty="0" smtClean="0"/>
               <a:t>Was haben wir bei dieser Aufgabe gelernt?</a:t>
             </a:r>
             <a:endParaRPr lang="de-DE" dirty="0"/>
@@ -4978,7 +5175,7 @@
           <a:p>
             <a:fld id="{1215FA07-EE23-A948-A6ED-56C5FE5A7EE4}" type="slidenum">
               <a:rPr lang="de-DE" smtClean="0"/>
-              <a:t>15</a:t>
+              <a:t>16</a:t>
             </a:fld>
             <a:endParaRPr lang="de-DE"/>
           </a:p>
@@ -5004,7 +5201,7 @@
 </p:sld>
 </file>
 
-<file path=ppt/slides/slide16.xml><?xml version="1.0" encoding="utf-8"?>
+<file path=ppt/slides/slide17.xml><?xml version="1.0" encoding="utf-8"?>
 <p:sld xmlns:a="http://schemas.openxmlformats.org/drawingml/2006/main" xmlns:r="http://schemas.openxmlformats.org/officeDocument/2006/relationships" xmlns:p="http://schemas.openxmlformats.org/presentationml/2006/main">
   <p:cSld>
     <p:spTree>

</xml_diff>